<commit_message>
Changed the file name from 'Adult" to 'data analysis and modelling'. Also worked on the reports and got inspiration for the MEng flow chart
</commit_message>
<xml_diff>
--- a/MEng_TaskB/Workflow.pptx
+++ b/MEng_TaskB/Workflow.pptx
@@ -5,13 +5,14 @@
     <p:sldMasterId id="2147483696" r:id="rId1"/>
   </p:sldMasterIdLst>
   <p:notesMasterIdLst>
-    <p:notesMasterId r:id="rId6"/>
+    <p:notesMasterId r:id="rId7"/>
   </p:notesMasterIdLst>
   <p:sldIdLst>
     <p:sldId id="256" r:id="rId2"/>
     <p:sldId id="258" r:id="rId3"/>
     <p:sldId id="257" r:id="rId4"/>
     <p:sldId id="259" r:id="rId5"/>
+    <p:sldId id="260" r:id="rId6"/>
   </p:sldIdLst>
   <p:sldSz cx="18000663" cy="10799763"/>
   <p:notesSz cx="6858000" cy="9144000"/>
@@ -110,6 +111,11 @@
       </a:defRPr>
     </a:lvl9pPr>
   </p:defaultTextStyle>
+  <p:extLst>
+    <p:ext uri="{EFAFB233-063F-42B5-8137-9DF3F51BA10A}">
+      <p15:sldGuideLst xmlns:p15="http://schemas.microsoft.com/office/powerpoint/2012/main"/>
+    </p:ext>
+  </p:extLst>
 </p:presentation>
 </file>
 
@@ -195,7 +201,7 @@
           <a:p>
             <a:fld id="{FF49E16E-2989-1745-9D61-1294F32D9A87}" type="datetimeFigureOut">
               <a:rPr lang="en-GB" smtClean="0"/>
-              <a:t>13/05/2024</a:t>
+              <a:t>16/05/2024</a:t>
             </a:fld>
             <a:endParaRPr lang="en-GB"/>
           </a:p>
@@ -862,7 +868,7 @@
           <a:p>
             <a:fld id="{3A92E194-DF06-FA4D-8131-9E9DFB55BFD9}" type="datetimeFigureOut">
               <a:rPr lang="en-GB" smtClean="0"/>
-              <a:t>13/05/2024</a:t>
+              <a:t>16/05/2024</a:t>
             </a:fld>
             <a:endParaRPr lang="en-GB"/>
           </a:p>
@@ -1032,7 +1038,7 @@
           <a:p>
             <a:fld id="{3A92E194-DF06-FA4D-8131-9E9DFB55BFD9}" type="datetimeFigureOut">
               <a:rPr lang="en-GB" smtClean="0"/>
-              <a:t>13/05/2024</a:t>
+              <a:t>16/05/2024</a:t>
             </a:fld>
             <a:endParaRPr lang="en-GB"/>
           </a:p>
@@ -1212,7 +1218,7 @@
           <a:p>
             <a:fld id="{3A92E194-DF06-FA4D-8131-9E9DFB55BFD9}" type="datetimeFigureOut">
               <a:rPr lang="en-GB" smtClean="0"/>
-              <a:t>13/05/2024</a:t>
+              <a:t>16/05/2024</a:t>
             </a:fld>
             <a:endParaRPr lang="en-GB"/>
           </a:p>
@@ -1382,7 +1388,7 @@
           <a:p>
             <a:fld id="{3A92E194-DF06-FA4D-8131-9E9DFB55BFD9}" type="datetimeFigureOut">
               <a:rPr lang="en-GB" smtClean="0"/>
-              <a:t>13/05/2024</a:t>
+              <a:t>16/05/2024</a:t>
             </a:fld>
             <a:endParaRPr lang="en-GB"/>
           </a:p>
@@ -1628,7 +1634,7 @@
           <a:p>
             <a:fld id="{3A92E194-DF06-FA4D-8131-9E9DFB55BFD9}" type="datetimeFigureOut">
               <a:rPr lang="en-GB" smtClean="0"/>
-              <a:t>13/05/2024</a:t>
+              <a:t>16/05/2024</a:t>
             </a:fld>
             <a:endParaRPr lang="en-GB"/>
           </a:p>
@@ -1860,7 +1866,7 @@
           <a:p>
             <a:fld id="{3A92E194-DF06-FA4D-8131-9E9DFB55BFD9}" type="datetimeFigureOut">
               <a:rPr lang="en-GB" smtClean="0"/>
-              <a:t>13/05/2024</a:t>
+              <a:t>16/05/2024</a:t>
             </a:fld>
             <a:endParaRPr lang="en-GB"/>
           </a:p>
@@ -2227,7 +2233,7 @@
           <a:p>
             <a:fld id="{3A92E194-DF06-FA4D-8131-9E9DFB55BFD9}" type="datetimeFigureOut">
               <a:rPr lang="en-GB" smtClean="0"/>
-              <a:t>13/05/2024</a:t>
+              <a:t>16/05/2024</a:t>
             </a:fld>
             <a:endParaRPr lang="en-GB"/>
           </a:p>
@@ -2345,7 +2351,7 @@
           <a:p>
             <a:fld id="{3A92E194-DF06-FA4D-8131-9E9DFB55BFD9}" type="datetimeFigureOut">
               <a:rPr lang="en-GB" smtClean="0"/>
-              <a:t>13/05/2024</a:t>
+              <a:t>16/05/2024</a:t>
             </a:fld>
             <a:endParaRPr lang="en-GB"/>
           </a:p>
@@ -2440,7 +2446,7 @@
           <a:p>
             <a:fld id="{3A92E194-DF06-FA4D-8131-9E9DFB55BFD9}" type="datetimeFigureOut">
               <a:rPr lang="en-GB" smtClean="0"/>
-              <a:t>13/05/2024</a:t>
+              <a:t>16/05/2024</a:t>
             </a:fld>
             <a:endParaRPr lang="en-GB"/>
           </a:p>
@@ -2717,7 +2723,7 @@
           <a:p>
             <a:fld id="{3A92E194-DF06-FA4D-8131-9E9DFB55BFD9}" type="datetimeFigureOut">
               <a:rPr lang="en-GB" smtClean="0"/>
-              <a:t>13/05/2024</a:t>
+              <a:t>16/05/2024</a:t>
             </a:fld>
             <a:endParaRPr lang="en-GB"/>
           </a:p>
@@ -2974,7 +2980,7 @@
           <a:p>
             <a:fld id="{3A92E194-DF06-FA4D-8131-9E9DFB55BFD9}" type="datetimeFigureOut">
               <a:rPr lang="en-GB" smtClean="0"/>
-              <a:t>13/05/2024</a:t>
+              <a:t>16/05/2024</a:t>
             </a:fld>
             <a:endParaRPr lang="en-GB"/>
           </a:p>
@@ -3187,7 +3193,7 @@
           <a:p>
             <a:fld id="{3A92E194-DF06-FA4D-8131-9E9DFB55BFD9}" type="datetimeFigureOut">
               <a:rPr lang="en-GB" smtClean="0"/>
-              <a:t>13/05/2024</a:t>
+              <a:t>16/05/2024</a:t>
             </a:fld>
             <a:endParaRPr lang="en-GB"/>
           </a:p>
@@ -5246,6 +5252,36 @@
     <p:extLst>
       <p:ext uri="{BB962C8B-B14F-4D97-AF65-F5344CB8AC3E}">
         <p14:creationId xmlns:p14="http://schemas.microsoft.com/office/powerpoint/2010/main" val="3604086504"/>
+      </p:ext>
+    </p:extLst>
+  </p:cSld>
+  <p:clrMapOvr>
+    <a:masterClrMapping/>
+  </p:clrMapOvr>
+</p:sld>
+</file>
+
+<file path=ppt/slides/slide5.xml><?xml version="1.0" encoding="utf-8"?>
+<p:sld xmlns:a="http://schemas.openxmlformats.org/drawingml/2006/main" xmlns:r="http://schemas.openxmlformats.org/officeDocument/2006/relationships" xmlns:p="http://schemas.openxmlformats.org/presentationml/2006/main">
+  <p:cSld>
+    <p:spTree>
+      <p:nvGrpSpPr>
+        <p:cNvPr id="1" name=""/>
+        <p:cNvGrpSpPr/>
+        <p:nvPr/>
+      </p:nvGrpSpPr>
+      <p:grpSpPr>
+        <a:xfrm>
+          <a:off x="0" y="0"/>
+          <a:ext cx="0" cy="0"/>
+          <a:chOff x="0" y="0"/>
+          <a:chExt cx="0" cy="0"/>
+        </a:xfrm>
+      </p:grpSpPr>
+    </p:spTree>
+    <p:extLst>
+      <p:ext uri="{BB962C8B-B14F-4D97-AF65-F5344CB8AC3E}">
+        <p14:creationId xmlns:p14="http://schemas.microsoft.com/office/powerpoint/2010/main" val="2844281230"/>
       </p:ext>
     </p:extLst>
   </p:cSld>

</xml_diff>

<commit_message>
WOrked on the flowchart and reports for PGDIP and MENG
</commit_message>
<xml_diff>
--- a/MEng_TaskB/Workflow.pptx
+++ b/MEng_TaskB/Workflow.pptx
@@ -5,14 +5,15 @@
     <p:sldMasterId id="2147483696" r:id="rId1"/>
   </p:sldMasterIdLst>
   <p:notesMasterIdLst>
-    <p:notesMasterId r:id="rId7"/>
+    <p:notesMasterId r:id="rId8"/>
   </p:notesMasterIdLst>
   <p:sldIdLst>
-    <p:sldId id="256" r:id="rId2"/>
-    <p:sldId id="258" r:id="rId3"/>
-    <p:sldId id="257" r:id="rId4"/>
-    <p:sldId id="259" r:id="rId5"/>
+    <p:sldId id="262" r:id="rId2"/>
+    <p:sldId id="257" r:id="rId3"/>
+    <p:sldId id="259" r:id="rId4"/>
+    <p:sldId id="261" r:id="rId5"/>
     <p:sldId id="260" r:id="rId6"/>
+    <p:sldId id="263" r:id="rId7"/>
   </p:sldIdLst>
   <p:sldSz cx="18000663" cy="10799763"/>
   <p:notesSz cx="6858000" cy="9144000"/>
@@ -20,7 +21,7 @@
     <a:defPPr>
       <a:defRPr lang="en-US"/>
     </a:defPPr>
-    <a:lvl1pPr marL="0" algn="l" defTabSz="457200" rtl="0" eaLnBrk="1" latinLnBrk="0" hangingPunct="1">
+    <a:lvl1pPr marL="0" algn="l" defTabSz="457116" rtl="0" eaLnBrk="1" latinLnBrk="0" hangingPunct="1">
       <a:defRPr sz="1800" kern="1200">
         <a:solidFill>
           <a:schemeClr val="tx1"/>
@@ -30,7 +31,7 @@
         <a:cs typeface="+mn-cs"/>
       </a:defRPr>
     </a:lvl1pPr>
-    <a:lvl2pPr marL="457200" algn="l" defTabSz="457200" rtl="0" eaLnBrk="1" latinLnBrk="0" hangingPunct="1">
+    <a:lvl2pPr marL="457116" algn="l" defTabSz="457116" rtl="0" eaLnBrk="1" latinLnBrk="0" hangingPunct="1">
       <a:defRPr sz="1800" kern="1200">
         <a:solidFill>
           <a:schemeClr val="tx1"/>
@@ -40,7 +41,7 @@
         <a:cs typeface="+mn-cs"/>
       </a:defRPr>
     </a:lvl2pPr>
-    <a:lvl3pPr marL="914400" algn="l" defTabSz="457200" rtl="0" eaLnBrk="1" latinLnBrk="0" hangingPunct="1">
+    <a:lvl3pPr marL="914234" algn="l" defTabSz="457116" rtl="0" eaLnBrk="1" latinLnBrk="0" hangingPunct="1">
       <a:defRPr sz="1800" kern="1200">
         <a:solidFill>
           <a:schemeClr val="tx1"/>
@@ -50,7 +51,7 @@
         <a:cs typeface="+mn-cs"/>
       </a:defRPr>
     </a:lvl3pPr>
-    <a:lvl4pPr marL="1371600" algn="l" defTabSz="457200" rtl="0" eaLnBrk="1" latinLnBrk="0" hangingPunct="1">
+    <a:lvl4pPr marL="1371350" algn="l" defTabSz="457116" rtl="0" eaLnBrk="1" latinLnBrk="0" hangingPunct="1">
       <a:defRPr sz="1800" kern="1200">
         <a:solidFill>
           <a:schemeClr val="tx1"/>
@@ -60,7 +61,7 @@
         <a:cs typeface="+mn-cs"/>
       </a:defRPr>
     </a:lvl4pPr>
-    <a:lvl5pPr marL="1828800" algn="l" defTabSz="457200" rtl="0" eaLnBrk="1" latinLnBrk="0" hangingPunct="1">
+    <a:lvl5pPr marL="1828467" algn="l" defTabSz="457116" rtl="0" eaLnBrk="1" latinLnBrk="0" hangingPunct="1">
       <a:defRPr sz="1800" kern="1200">
         <a:solidFill>
           <a:schemeClr val="tx1"/>
@@ -70,7 +71,7 @@
         <a:cs typeface="+mn-cs"/>
       </a:defRPr>
     </a:lvl5pPr>
-    <a:lvl6pPr marL="2286000" algn="l" defTabSz="457200" rtl="0" eaLnBrk="1" latinLnBrk="0" hangingPunct="1">
+    <a:lvl6pPr marL="2285583" algn="l" defTabSz="457116" rtl="0" eaLnBrk="1" latinLnBrk="0" hangingPunct="1">
       <a:defRPr sz="1800" kern="1200">
         <a:solidFill>
           <a:schemeClr val="tx1"/>
@@ -80,7 +81,7 @@
         <a:cs typeface="+mn-cs"/>
       </a:defRPr>
     </a:lvl6pPr>
-    <a:lvl7pPr marL="2743200" algn="l" defTabSz="457200" rtl="0" eaLnBrk="1" latinLnBrk="0" hangingPunct="1">
+    <a:lvl7pPr marL="2742700" algn="l" defTabSz="457116" rtl="0" eaLnBrk="1" latinLnBrk="0" hangingPunct="1">
       <a:defRPr sz="1800" kern="1200">
         <a:solidFill>
           <a:schemeClr val="tx1"/>
@@ -90,7 +91,7 @@
         <a:cs typeface="+mn-cs"/>
       </a:defRPr>
     </a:lvl7pPr>
-    <a:lvl8pPr marL="3200400" algn="l" defTabSz="457200" rtl="0" eaLnBrk="1" latinLnBrk="0" hangingPunct="1">
+    <a:lvl8pPr marL="3199817" algn="l" defTabSz="457116" rtl="0" eaLnBrk="1" latinLnBrk="0" hangingPunct="1">
       <a:defRPr sz="1800" kern="1200">
         <a:solidFill>
           <a:schemeClr val="tx1"/>
@@ -100,7 +101,7 @@
         <a:cs typeface="+mn-cs"/>
       </a:defRPr>
     </a:lvl8pPr>
-    <a:lvl9pPr marL="3657600" algn="l" defTabSz="457200" rtl="0" eaLnBrk="1" latinLnBrk="0" hangingPunct="1">
+    <a:lvl9pPr marL="3656933" algn="l" defTabSz="457116" rtl="0" eaLnBrk="1" latinLnBrk="0" hangingPunct="1">
       <a:defRPr sz="1800" kern="1200">
         <a:solidFill>
           <a:schemeClr val="tx1"/>
@@ -201,7 +202,7 @@
           <a:p>
             <a:fld id="{FF49E16E-2989-1745-9D61-1294F32D9A87}" type="datetimeFigureOut">
               <a:rPr lang="en-GB" smtClean="0"/>
-              <a:t>16/05/2024</a:t>
+              <a:t>17/05/2024</a:t>
             </a:fld>
             <a:endParaRPr lang="en-GB"/>
           </a:p>
@@ -374,8 +375,8 @@
   </p:cSld>
   <p:clrMap bg1="lt1" tx1="dk1" bg2="lt2" tx2="dk2" accent1="accent1" accent2="accent2" accent3="accent3" accent4="accent4" accent5="accent5" accent6="accent6" hlink="hlink" folHlink="folHlink"/>
   <p:notesStyle>
-    <a:lvl1pPr marL="0" algn="l" defTabSz="914400" rtl="0" eaLnBrk="1" latinLnBrk="0" hangingPunct="1">
-      <a:defRPr sz="1200" kern="1200">
+    <a:lvl1pPr marL="0" algn="l" defTabSz="914234" rtl="0" eaLnBrk="1" latinLnBrk="0" hangingPunct="1">
+      <a:defRPr sz="1199" kern="1200">
         <a:solidFill>
           <a:schemeClr val="tx1"/>
         </a:solidFill>
@@ -384,8 +385,8 @@
         <a:cs typeface="+mn-cs"/>
       </a:defRPr>
     </a:lvl1pPr>
-    <a:lvl2pPr marL="457200" algn="l" defTabSz="914400" rtl="0" eaLnBrk="1" latinLnBrk="0" hangingPunct="1">
-      <a:defRPr sz="1200" kern="1200">
+    <a:lvl2pPr marL="457116" algn="l" defTabSz="914234" rtl="0" eaLnBrk="1" latinLnBrk="0" hangingPunct="1">
+      <a:defRPr sz="1199" kern="1200">
         <a:solidFill>
           <a:schemeClr val="tx1"/>
         </a:solidFill>
@@ -394,8 +395,8 @@
         <a:cs typeface="+mn-cs"/>
       </a:defRPr>
     </a:lvl2pPr>
-    <a:lvl3pPr marL="914400" algn="l" defTabSz="914400" rtl="0" eaLnBrk="1" latinLnBrk="0" hangingPunct="1">
-      <a:defRPr sz="1200" kern="1200">
+    <a:lvl3pPr marL="914234" algn="l" defTabSz="914234" rtl="0" eaLnBrk="1" latinLnBrk="0" hangingPunct="1">
+      <a:defRPr sz="1199" kern="1200">
         <a:solidFill>
           <a:schemeClr val="tx1"/>
         </a:solidFill>
@@ -404,8 +405,8 @@
         <a:cs typeface="+mn-cs"/>
       </a:defRPr>
     </a:lvl3pPr>
-    <a:lvl4pPr marL="1371600" algn="l" defTabSz="914400" rtl="0" eaLnBrk="1" latinLnBrk="0" hangingPunct="1">
-      <a:defRPr sz="1200" kern="1200">
+    <a:lvl4pPr marL="1371350" algn="l" defTabSz="914234" rtl="0" eaLnBrk="1" latinLnBrk="0" hangingPunct="1">
+      <a:defRPr sz="1199" kern="1200">
         <a:solidFill>
           <a:schemeClr val="tx1"/>
         </a:solidFill>
@@ -414,8 +415,8 @@
         <a:cs typeface="+mn-cs"/>
       </a:defRPr>
     </a:lvl4pPr>
-    <a:lvl5pPr marL="1828800" algn="l" defTabSz="914400" rtl="0" eaLnBrk="1" latinLnBrk="0" hangingPunct="1">
-      <a:defRPr sz="1200" kern="1200">
+    <a:lvl5pPr marL="1828467" algn="l" defTabSz="914234" rtl="0" eaLnBrk="1" latinLnBrk="0" hangingPunct="1">
+      <a:defRPr sz="1199" kern="1200">
         <a:solidFill>
           <a:schemeClr val="tx1"/>
         </a:solidFill>
@@ -424,8 +425,8 @@
         <a:cs typeface="+mn-cs"/>
       </a:defRPr>
     </a:lvl5pPr>
-    <a:lvl6pPr marL="2286000" algn="l" defTabSz="914400" rtl="0" eaLnBrk="1" latinLnBrk="0" hangingPunct="1">
-      <a:defRPr sz="1200" kern="1200">
+    <a:lvl6pPr marL="2285583" algn="l" defTabSz="914234" rtl="0" eaLnBrk="1" latinLnBrk="0" hangingPunct="1">
+      <a:defRPr sz="1199" kern="1200">
         <a:solidFill>
           <a:schemeClr val="tx1"/>
         </a:solidFill>
@@ -434,8 +435,8 @@
         <a:cs typeface="+mn-cs"/>
       </a:defRPr>
     </a:lvl6pPr>
-    <a:lvl7pPr marL="2743200" algn="l" defTabSz="914400" rtl="0" eaLnBrk="1" latinLnBrk="0" hangingPunct="1">
-      <a:defRPr sz="1200" kern="1200">
+    <a:lvl7pPr marL="2742700" algn="l" defTabSz="914234" rtl="0" eaLnBrk="1" latinLnBrk="0" hangingPunct="1">
+      <a:defRPr sz="1199" kern="1200">
         <a:solidFill>
           <a:schemeClr val="tx1"/>
         </a:solidFill>
@@ -444,8 +445,8 @@
         <a:cs typeface="+mn-cs"/>
       </a:defRPr>
     </a:lvl7pPr>
-    <a:lvl8pPr marL="3200400" algn="l" defTabSz="914400" rtl="0" eaLnBrk="1" latinLnBrk="0" hangingPunct="1">
-      <a:defRPr sz="1200" kern="1200">
+    <a:lvl8pPr marL="3199817" algn="l" defTabSz="914234" rtl="0" eaLnBrk="1" latinLnBrk="0" hangingPunct="1">
+      <a:defRPr sz="1199" kern="1200">
         <a:solidFill>
           <a:schemeClr val="tx1"/>
         </a:solidFill>
@@ -454,8 +455,8 @@
         <a:cs typeface="+mn-cs"/>
       </a:defRPr>
     </a:lvl8pPr>
-    <a:lvl9pPr marL="3657600" algn="l" defTabSz="914400" rtl="0" eaLnBrk="1" latinLnBrk="0" hangingPunct="1">
-      <a:defRPr sz="1200" kern="1200">
+    <a:lvl9pPr marL="3656933" algn="l" defTabSz="914234" rtl="0" eaLnBrk="1" latinLnBrk="0" hangingPunct="1">
+      <a:defRPr sz="1199" kern="1200">
         <a:solidFill>
           <a:schemeClr val="tx1"/>
         </a:solidFill>
@@ -588,7 +589,7 @@
           <a:p>
             <a:fld id="{1F12373E-1564-7A43-B08C-0C3BDE113B8A}" type="slidenum">
               <a:rPr lang="en-GB" smtClean="0"/>
-              <a:t>3</a:t>
+              <a:t>2</a:t>
             </a:fld>
             <a:endParaRPr lang="en-GB"/>
           </a:p>
@@ -718,7 +719,7 @@
           <a:p>
             <a:fld id="{1F12373E-1564-7A43-B08C-0C3BDE113B8A}" type="slidenum">
               <a:rPr lang="en-GB" smtClean="0"/>
-              <a:t>4</a:t>
+              <a:t>3</a:t>
             </a:fld>
             <a:endParaRPr lang="en-GB"/>
           </a:p>
@@ -728,6 +729,174 @@
     <p:extLst>
       <p:ext uri="{BB962C8B-B14F-4D97-AF65-F5344CB8AC3E}">
         <p14:creationId xmlns:p14="http://schemas.microsoft.com/office/powerpoint/2010/main" val="314840053"/>
+      </p:ext>
+    </p:extLst>
+  </p:cSld>
+  <p:clrMapOvr>
+    <a:masterClrMapping/>
+  </p:clrMapOvr>
+</p:notes>
+</file>
+
+<file path=ppt/notesSlides/notesSlide3.xml><?xml version="1.0" encoding="utf-8"?>
+<p:notes xmlns:a="http://schemas.openxmlformats.org/drawingml/2006/main" xmlns:r="http://schemas.openxmlformats.org/officeDocument/2006/relationships" xmlns:p="http://schemas.openxmlformats.org/presentationml/2006/main">
+  <p:cSld>
+    <p:spTree>
+      <p:nvGrpSpPr>
+        <p:cNvPr id="1" name=""/>
+        <p:cNvGrpSpPr/>
+        <p:nvPr/>
+      </p:nvGrpSpPr>
+      <p:grpSpPr>
+        <a:xfrm>
+          <a:off x="0" y="0"/>
+          <a:ext cx="0" cy="0"/>
+          <a:chOff x="0" y="0"/>
+          <a:chExt cx="0" cy="0"/>
+        </a:xfrm>
+      </p:grpSpPr>
+      <p:sp>
+        <p:nvSpPr>
+          <p:cNvPr id="2" name="Slide Image Placeholder 1"/>
+          <p:cNvSpPr>
+            <a:spLocks noGrp="1" noRot="1" noChangeAspect="1"/>
+          </p:cNvSpPr>
+          <p:nvPr>
+            <p:ph type="sldImg"/>
+          </p:nvPr>
+        </p:nvSpPr>
+        <p:spPr/>
+      </p:sp>
+      <p:sp>
+        <p:nvSpPr>
+          <p:cNvPr id="3" name="Notes Placeholder 2"/>
+          <p:cNvSpPr>
+            <a:spLocks noGrp="1"/>
+          </p:cNvSpPr>
+          <p:nvPr>
+            <p:ph type="body" idx="1"/>
+          </p:nvPr>
+        </p:nvSpPr>
+        <p:spPr/>
+        <p:txBody>
+          <a:bodyPr/>
+          <a:lstStyle/>
+          <a:p>
+            <a:endParaRPr lang="en-GB"/>
+          </a:p>
+        </p:txBody>
+      </p:sp>
+      <p:sp>
+        <p:nvSpPr>
+          <p:cNvPr id="4" name="Slide Number Placeholder 3"/>
+          <p:cNvSpPr>
+            <a:spLocks noGrp="1"/>
+          </p:cNvSpPr>
+          <p:nvPr>
+            <p:ph type="sldNum" sz="quarter" idx="5"/>
+          </p:nvPr>
+        </p:nvSpPr>
+        <p:spPr/>
+        <p:txBody>
+          <a:bodyPr/>
+          <a:lstStyle/>
+          <a:p>
+            <a:fld id="{1F12373E-1564-7A43-B08C-0C3BDE113B8A}" type="slidenum">
+              <a:rPr lang="en-GB" smtClean="0"/>
+              <a:t>5</a:t>
+            </a:fld>
+            <a:endParaRPr lang="en-GB"/>
+          </a:p>
+        </p:txBody>
+      </p:sp>
+    </p:spTree>
+    <p:extLst>
+      <p:ext uri="{BB962C8B-B14F-4D97-AF65-F5344CB8AC3E}">
+        <p14:creationId xmlns:p14="http://schemas.microsoft.com/office/powerpoint/2010/main" val="1682592736"/>
+      </p:ext>
+    </p:extLst>
+  </p:cSld>
+  <p:clrMapOvr>
+    <a:masterClrMapping/>
+  </p:clrMapOvr>
+</p:notes>
+</file>
+
+<file path=ppt/notesSlides/notesSlide4.xml><?xml version="1.0" encoding="utf-8"?>
+<p:notes xmlns:a="http://schemas.openxmlformats.org/drawingml/2006/main" xmlns:r="http://schemas.openxmlformats.org/officeDocument/2006/relationships" xmlns:p="http://schemas.openxmlformats.org/presentationml/2006/main">
+  <p:cSld>
+    <p:spTree>
+      <p:nvGrpSpPr>
+        <p:cNvPr id="1" name=""/>
+        <p:cNvGrpSpPr/>
+        <p:nvPr/>
+      </p:nvGrpSpPr>
+      <p:grpSpPr>
+        <a:xfrm>
+          <a:off x="0" y="0"/>
+          <a:ext cx="0" cy="0"/>
+          <a:chOff x="0" y="0"/>
+          <a:chExt cx="0" cy="0"/>
+        </a:xfrm>
+      </p:grpSpPr>
+      <p:sp>
+        <p:nvSpPr>
+          <p:cNvPr id="2" name="Slide Image Placeholder 1"/>
+          <p:cNvSpPr>
+            <a:spLocks noGrp="1" noRot="1" noChangeAspect="1"/>
+          </p:cNvSpPr>
+          <p:nvPr>
+            <p:ph type="sldImg"/>
+          </p:nvPr>
+        </p:nvSpPr>
+        <p:spPr/>
+      </p:sp>
+      <p:sp>
+        <p:nvSpPr>
+          <p:cNvPr id="3" name="Notes Placeholder 2"/>
+          <p:cNvSpPr>
+            <a:spLocks noGrp="1"/>
+          </p:cNvSpPr>
+          <p:nvPr>
+            <p:ph type="body" idx="1"/>
+          </p:nvPr>
+        </p:nvSpPr>
+        <p:spPr/>
+        <p:txBody>
+          <a:bodyPr/>
+          <a:lstStyle/>
+          <a:p>
+            <a:endParaRPr lang="en-GB"/>
+          </a:p>
+        </p:txBody>
+      </p:sp>
+      <p:sp>
+        <p:nvSpPr>
+          <p:cNvPr id="4" name="Slide Number Placeholder 3"/>
+          <p:cNvSpPr>
+            <a:spLocks noGrp="1"/>
+          </p:cNvSpPr>
+          <p:nvPr>
+            <p:ph type="sldNum" sz="quarter" idx="5"/>
+          </p:nvPr>
+        </p:nvSpPr>
+        <p:spPr/>
+        <p:txBody>
+          <a:bodyPr/>
+          <a:lstStyle/>
+          <a:p>
+            <a:fld id="{1F12373E-1564-7A43-B08C-0C3BDE113B8A}" type="slidenum">
+              <a:rPr lang="en-GB" smtClean="0"/>
+              <a:t>6</a:t>
+            </a:fld>
+            <a:endParaRPr lang="en-GB"/>
+          </a:p>
+        </p:txBody>
+      </p:sp>
+    </p:spTree>
+    <p:extLst>
+      <p:ext uri="{BB962C8B-B14F-4D97-AF65-F5344CB8AC3E}">
+        <p14:creationId xmlns:p14="http://schemas.microsoft.com/office/powerpoint/2010/main" val="3967637167"/>
       </p:ext>
     </p:extLst>
   </p:cSld>
@@ -868,7 +1037,7 @@
           <a:p>
             <a:fld id="{3A92E194-DF06-FA4D-8131-9E9DFB55BFD9}" type="datetimeFigureOut">
               <a:rPr lang="en-GB" smtClean="0"/>
-              <a:t>16/05/2024</a:t>
+              <a:t>17/05/2024</a:t>
             </a:fld>
             <a:endParaRPr lang="en-GB"/>
           </a:p>
@@ -1038,7 +1207,7 @@
           <a:p>
             <a:fld id="{3A92E194-DF06-FA4D-8131-9E9DFB55BFD9}" type="datetimeFigureOut">
               <a:rPr lang="en-GB" smtClean="0"/>
-              <a:t>16/05/2024</a:t>
+              <a:t>17/05/2024</a:t>
             </a:fld>
             <a:endParaRPr lang="en-GB"/>
           </a:p>
@@ -1128,7 +1297,7 @@
         </p:nvSpPr>
         <p:spPr>
           <a:xfrm>
-            <a:off x="12881724" y="574987"/>
+            <a:off x="12881725" y="574987"/>
             <a:ext cx="3881393" cy="9152300"/>
           </a:xfrm>
         </p:spPr>
@@ -1156,7 +1325,7 @@
         </p:nvSpPr>
         <p:spPr>
           <a:xfrm>
-            <a:off x="1237545" y="574987"/>
+            <a:off x="1237546" y="574987"/>
             <a:ext cx="11419171" cy="9152300"/>
           </a:xfrm>
         </p:spPr>
@@ -1218,7 +1387,7 @@
           <a:p>
             <a:fld id="{3A92E194-DF06-FA4D-8131-9E9DFB55BFD9}" type="datetimeFigureOut">
               <a:rPr lang="en-GB" smtClean="0"/>
-              <a:t>16/05/2024</a:t>
+              <a:t>17/05/2024</a:t>
             </a:fld>
             <a:endParaRPr lang="en-GB"/>
           </a:p>
@@ -1388,7 +1557,7 @@
           <a:p>
             <a:fld id="{3A92E194-DF06-FA4D-8131-9E9DFB55BFD9}" type="datetimeFigureOut">
               <a:rPr lang="en-GB" smtClean="0"/>
-              <a:t>16/05/2024</a:t>
+              <a:t>17/05/2024</a:t>
             </a:fld>
             <a:endParaRPr lang="en-GB"/>
           </a:p>
@@ -1478,7 +1647,7 @@
         </p:nvSpPr>
         <p:spPr>
           <a:xfrm>
-            <a:off x="1228170" y="2692442"/>
+            <a:off x="1228171" y="2692444"/>
             <a:ext cx="15525572" cy="4492401"/>
           </a:xfrm>
         </p:spPr>
@@ -1510,7 +1679,7 @@
         </p:nvSpPr>
         <p:spPr>
           <a:xfrm>
-            <a:off x="1228170" y="7227343"/>
+            <a:off x="1228171" y="7227345"/>
             <a:ext cx="15525572" cy="2362447"/>
           </a:xfrm>
         </p:spPr>
@@ -1634,7 +1803,7 @@
           <a:p>
             <a:fld id="{3A92E194-DF06-FA4D-8131-9E9DFB55BFD9}" type="datetimeFigureOut">
               <a:rPr lang="en-GB" smtClean="0"/>
-              <a:t>16/05/2024</a:t>
+              <a:t>17/05/2024</a:t>
             </a:fld>
             <a:endParaRPr lang="en-GB"/>
           </a:p>
@@ -1866,7 +2035,7 @@
           <a:p>
             <a:fld id="{3A92E194-DF06-FA4D-8131-9E9DFB55BFD9}" type="datetimeFigureOut">
               <a:rPr lang="en-GB" smtClean="0"/>
-              <a:t>16/05/2024</a:t>
+              <a:t>17/05/2024</a:t>
             </a:fld>
             <a:endParaRPr lang="en-GB"/>
           </a:p>
@@ -1956,7 +2125,7 @@
         </p:nvSpPr>
         <p:spPr>
           <a:xfrm>
-            <a:off x="1239890" y="574988"/>
+            <a:off x="1239891" y="574990"/>
             <a:ext cx="15525572" cy="2087455"/>
           </a:xfrm>
         </p:spPr>
@@ -1984,8 +2153,8 @@
         </p:nvSpPr>
         <p:spPr>
           <a:xfrm>
-            <a:off x="1239891" y="2647443"/>
-            <a:ext cx="7615123" cy="1297471"/>
+            <a:off x="1239890" y="2647444"/>
+            <a:ext cx="7615124" cy="1297471"/>
           </a:xfrm>
         </p:spPr>
         <p:txBody>
@@ -2049,8 +2218,8 @@
         </p:nvSpPr>
         <p:spPr>
           <a:xfrm>
-            <a:off x="1239891" y="3944914"/>
-            <a:ext cx="7615123" cy="5802373"/>
+            <a:off x="1239890" y="3944915"/>
+            <a:ext cx="7615124" cy="5802373"/>
           </a:xfrm>
         </p:spPr>
         <p:txBody>
@@ -2106,7 +2275,7 @@
         </p:nvSpPr>
         <p:spPr>
           <a:xfrm>
-            <a:off x="9112836" y="2647443"/>
+            <a:off x="9112836" y="2647444"/>
             <a:ext cx="7652626" cy="1297471"/>
           </a:xfrm>
         </p:spPr>
@@ -2171,7 +2340,7 @@
         </p:nvSpPr>
         <p:spPr>
           <a:xfrm>
-            <a:off x="9112836" y="3944914"/>
+            <a:off x="9112836" y="3944915"/>
             <a:ext cx="7652626" cy="5802373"/>
           </a:xfrm>
         </p:spPr>
@@ -2233,7 +2402,7 @@
           <a:p>
             <a:fld id="{3A92E194-DF06-FA4D-8131-9E9DFB55BFD9}" type="datetimeFigureOut">
               <a:rPr lang="en-GB" smtClean="0"/>
-              <a:t>16/05/2024</a:t>
+              <a:t>17/05/2024</a:t>
             </a:fld>
             <a:endParaRPr lang="en-GB"/>
           </a:p>
@@ -2351,7 +2520,7 @@
           <a:p>
             <a:fld id="{3A92E194-DF06-FA4D-8131-9E9DFB55BFD9}" type="datetimeFigureOut">
               <a:rPr lang="en-GB" smtClean="0"/>
-              <a:t>16/05/2024</a:t>
+              <a:t>17/05/2024</a:t>
             </a:fld>
             <a:endParaRPr lang="en-GB"/>
           </a:p>
@@ -2446,7 +2615,7 @@
           <a:p>
             <a:fld id="{3A92E194-DF06-FA4D-8131-9E9DFB55BFD9}" type="datetimeFigureOut">
               <a:rPr lang="en-GB" smtClean="0"/>
-              <a:t>16/05/2024</a:t>
+              <a:t>17/05/2024</a:t>
             </a:fld>
             <a:endParaRPr lang="en-GB"/>
           </a:p>
@@ -2537,7 +2706,7 @@
         <p:spPr>
           <a:xfrm>
             <a:off x="1239891" y="719984"/>
-            <a:ext cx="5805682" cy="2519945"/>
+            <a:ext cx="5805683" cy="2519945"/>
           </a:xfrm>
         </p:spPr>
         <p:txBody>
@@ -2568,8 +2737,8 @@
         </p:nvSpPr>
         <p:spPr>
           <a:xfrm>
-            <a:off x="7652626" y="1554966"/>
-            <a:ext cx="9112836" cy="7674832"/>
+            <a:off x="7652627" y="1554966"/>
+            <a:ext cx="9112837" cy="7674832"/>
           </a:xfrm>
         </p:spPr>
         <p:txBody>
@@ -2654,7 +2823,7 @@
         <p:spPr>
           <a:xfrm>
             <a:off x="1239891" y="3239929"/>
-            <a:ext cx="5805682" cy="6002369"/>
+            <a:ext cx="5805683" cy="6002369"/>
           </a:xfrm>
         </p:spPr>
         <p:txBody>
@@ -2723,7 +2892,7 @@
           <a:p>
             <a:fld id="{3A92E194-DF06-FA4D-8131-9E9DFB55BFD9}" type="datetimeFigureOut">
               <a:rPr lang="en-GB" smtClean="0"/>
-              <a:t>16/05/2024</a:t>
+              <a:t>17/05/2024</a:t>
             </a:fld>
             <a:endParaRPr lang="en-GB"/>
           </a:p>
@@ -2814,7 +2983,7 @@
         <p:spPr>
           <a:xfrm>
             <a:off x="1239891" y="719984"/>
-            <a:ext cx="5805682" cy="2519945"/>
+            <a:ext cx="5805683" cy="2519945"/>
           </a:xfrm>
         </p:spPr>
         <p:txBody>
@@ -2845,8 +3014,8 @@
         </p:nvSpPr>
         <p:spPr>
           <a:xfrm>
-            <a:off x="7652626" y="1554966"/>
-            <a:ext cx="9112836" cy="7674832"/>
+            <a:off x="7652627" y="1554966"/>
+            <a:ext cx="9112837" cy="7674832"/>
           </a:xfrm>
         </p:spPr>
         <p:txBody>
@@ -2911,7 +3080,7 @@
         <p:spPr>
           <a:xfrm>
             <a:off x="1239891" y="3239929"/>
-            <a:ext cx="5805682" cy="6002369"/>
+            <a:ext cx="5805683" cy="6002369"/>
           </a:xfrm>
         </p:spPr>
         <p:txBody>
@@ -2980,7 +3149,7 @@
           <a:p>
             <a:fld id="{3A92E194-DF06-FA4D-8131-9E9DFB55BFD9}" type="datetimeFigureOut">
               <a:rPr lang="en-GB" smtClean="0"/>
-              <a:t>16/05/2024</a:t>
+              <a:t>17/05/2024</a:t>
             </a:fld>
             <a:endParaRPr lang="en-GB"/>
           </a:p>
@@ -3075,7 +3244,7 @@
         </p:nvSpPr>
         <p:spPr>
           <a:xfrm>
-            <a:off x="1237546" y="574988"/>
+            <a:off x="1237547" y="574990"/>
             <a:ext cx="15525572" cy="2087455"/>
           </a:xfrm>
           <a:prstGeom prst="rect">
@@ -3108,7 +3277,7 @@
         </p:nvSpPr>
         <p:spPr>
           <a:xfrm>
-            <a:off x="1237546" y="2874937"/>
+            <a:off x="1237547" y="2874937"/>
             <a:ext cx="15525572" cy="6852350"/>
           </a:xfrm>
           <a:prstGeom prst="rect">
@@ -3170,7 +3339,7 @@
         </p:nvSpPr>
         <p:spPr>
           <a:xfrm>
-            <a:off x="1237546" y="10009781"/>
+            <a:off x="1237547" y="10009783"/>
             <a:ext cx="4050149" cy="574987"/>
           </a:xfrm>
           <a:prstGeom prst="rect">
@@ -3193,7 +3362,7 @@
           <a:p>
             <a:fld id="{3A92E194-DF06-FA4D-8131-9E9DFB55BFD9}" type="datetimeFigureOut">
               <a:rPr lang="en-GB" smtClean="0"/>
-              <a:t>16/05/2024</a:t>
+              <a:t>17/05/2024</a:t>
             </a:fld>
             <a:endParaRPr lang="en-GB"/>
           </a:p>
@@ -3211,7 +3380,7 @@
         </p:nvSpPr>
         <p:spPr>
           <a:xfrm>
-            <a:off x="5962720" y="10009781"/>
+            <a:off x="5962721" y="10009783"/>
             <a:ext cx="6075224" cy="574987"/>
           </a:xfrm>
           <a:prstGeom prst="rect">
@@ -3248,7 +3417,7 @@
         </p:nvSpPr>
         <p:spPr>
           <a:xfrm>
-            <a:off x="12712968" y="10009781"/>
+            <a:off x="12712969" y="10009783"/>
             <a:ext cx="4050149" cy="574987"/>
           </a:xfrm>
           <a:prstGeom prst="rect">
@@ -3584,6 +3753,14 @@
 <file path=ppt/slides/slide1.xml><?xml version="1.0" encoding="utf-8"?>
 <p:sld xmlns:a="http://schemas.openxmlformats.org/drawingml/2006/main" xmlns:r="http://schemas.openxmlformats.org/officeDocument/2006/relationships" xmlns:p="http://schemas.openxmlformats.org/presentationml/2006/main">
   <p:cSld>
+    <p:bg>
+      <p:bgPr>
+        <a:solidFill>
+          <a:schemeClr val="bg1"/>
+        </a:solidFill>
+        <a:effectLst/>
+      </p:bgPr>
+    </p:bg>
     <p:spTree>
       <p:nvGrpSpPr>
         <p:cNvPr id="1" name=""/>
@@ -3598,12 +3775,419 @@
           <a:chExt cx="0" cy="0"/>
         </a:xfrm>
       </p:grpSpPr>
+      <p:sp useBgFill="1">
+        <p:nvSpPr>
+          <p:cNvPr id="7" name="Rectangle 6">
+            <a:extLst>
+              <a:ext uri="{FF2B5EF4-FFF2-40B4-BE49-F238E27FC236}">
+                <a16:creationId xmlns:a16="http://schemas.microsoft.com/office/drawing/2014/main" id="{FFD48BC7-DC40-47DE-87EE-9F4B6ECB9ABB}"/>
+              </a:ext>
+              <a:ext uri="{C183D7F6-B498-43B3-948B-1728B52AA6E4}">
+                <adec:decorative xmlns:adec="http://schemas.microsoft.com/office/drawing/2017/decorative" val="1"/>
+              </a:ext>
+            </a:extLst>
+          </p:cNvPr>
+          <p:cNvSpPr>
+            <a:spLocks noGrp="1" noRot="1" noChangeAspect="1" noMove="1" noResize="1" noEditPoints="1" noAdjustHandles="1" noChangeArrowheads="1" noChangeShapeType="1" noTextEdit="1"/>
+          </p:cNvSpPr>
+          <p:nvPr>
+            <p:extLst>
+              <p:ext uri="{386F3935-93C4-4BCD-93E2-E3B085C9AB24}">
+                <p16:designElem xmlns:p16="http://schemas.microsoft.com/office/powerpoint/2015/main" val="1"/>
+              </p:ext>
+            </p:extLst>
+          </p:nvPr>
+        </p:nvSpPr>
+        <p:spPr>
+          <a:xfrm>
+            <a:off x="0" y="0"/>
+            <a:ext cx="18000662" cy="10799762"/>
+          </a:xfrm>
+          <a:prstGeom prst="rect">
+            <a:avLst/>
+          </a:prstGeom>
+          <a:ln>
+            <a:noFill/>
+          </a:ln>
+        </p:spPr>
+        <p:style>
+          <a:lnRef idx="2">
+            <a:schemeClr val="accent1">
+              <a:shade val="50000"/>
+            </a:schemeClr>
+          </a:lnRef>
+          <a:fillRef idx="1">
+            <a:schemeClr val="accent1"/>
+          </a:fillRef>
+          <a:effectRef idx="0">
+            <a:schemeClr val="accent1"/>
+          </a:effectRef>
+          <a:fontRef idx="minor">
+            <a:schemeClr val="lt1"/>
+          </a:fontRef>
+        </p:style>
+        <p:txBody>
+          <a:bodyPr rtlCol="0" anchor="ctr"/>
+          <a:lstStyle/>
+          <a:p>
+            <a:pPr algn="ctr"/>
+            <a:endParaRPr lang="en-US"/>
+          </a:p>
+        </p:txBody>
+      </p:sp>
+      <p:sp useBgFill="1">
+        <p:nvSpPr>
+          <p:cNvPr id="9" name="Freeform: Shape 8">
+            <a:extLst>
+              <a:ext uri="{FF2B5EF4-FFF2-40B4-BE49-F238E27FC236}">
+                <a16:creationId xmlns:a16="http://schemas.microsoft.com/office/drawing/2014/main" id="{E502BBC7-2C76-46F3-BC24-5985BC13DB88}"/>
+              </a:ext>
+              <a:ext uri="{C183D7F6-B498-43B3-948B-1728B52AA6E4}">
+                <adec:decorative xmlns:adec="http://schemas.microsoft.com/office/drawing/2017/decorative" val="1"/>
+              </a:ext>
+            </a:extLst>
+          </p:cNvPr>
+          <p:cNvSpPr>
+            <a:spLocks noGrp="1" noRot="1" noChangeAspect="1" noMove="1" noResize="1" noEditPoints="1" noAdjustHandles="1" noChangeArrowheads="1" noChangeShapeType="1" noTextEdit="1"/>
+          </p:cNvSpPr>
+          <p:nvPr>
+            <p:extLst>
+              <p:ext uri="{386F3935-93C4-4BCD-93E2-E3B085C9AB24}">
+                <p16:designElem xmlns:p16="http://schemas.microsoft.com/office/powerpoint/2015/main" val="1"/>
+              </p:ext>
+            </p:extLst>
+          </p:nvPr>
+        </p:nvSpPr>
+        <p:spPr>
+          <a:xfrm>
+            <a:off x="1645373" y="0"/>
+            <a:ext cx="14709916" cy="10799762"/>
+          </a:xfrm>
+          <a:custGeom>
+            <a:avLst/>
+            <a:gdLst>
+              <a:gd name="connsiteX0" fmla="*/ 1595771 w 9963150"/>
+              <a:gd name="connsiteY0" fmla="*/ 0 h 6858000"/>
+              <a:gd name="connsiteX1" fmla="*/ 8367379 w 9963150"/>
+              <a:gd name="connsiteY1" fmla="*/ 0 h 6858000"/>
+              <a:gd name="connsiteX2" fmla="*/ 8504080 w 9963150"/>
+              <a:gd name="connsiteY2" fmla="*/ 130333 h 6858000"/>
+              <a:gd name="connsiteX3" fmla="*/ 9963150 w 9963150"/>
+              <a:gd name="connsiteY3" fmla="*/ 3652838 h 6858000"/>
+              <a:gd name="connsiteX4" fmla="*/ 8825600 w 9963150"/>
+              <a:gd name="connsiteY4" fmla="*/ 6821583 h 6858000"/>
+              <a:gd name="connsiteX5" fmla="*/ 8794055 w 9963150"/>
+              <a:gd name="connsiteY5" fmla="*/ 6858000 h 6858000"/>
+              <a:gd name="connsiteX6" fmla="*/ 1169096 w 9963150"/>
+              <a:gd name="connsiteY6" fmla="*/ 6858000 h 6858000"/>
+              <a:gd name="connsiteX7" fmla="*/ 1137550 w 9963150"/>
+              <a:gd name="connsiteY7" fmla="*/ 6821583 h 6858000"/>
+              <a:gd name="connsiteX8" fmla="*/ 0 w 9963150"/>
+              <a:gd name="connsiteY8" fmla="*/ 3652838 h 6858000"/>
+              <a:gd name="connsiteX9" fmla="*/ 1459070 w 9963150"/>
+              <a:gd name="connsiteY9" fmla="*/ 130333 h 6858000"/>
+            </a:gdLst>
+            <a:ahLst/>
+            <a:cxnLst>
+              <a:cxn ang="0">
+                <a:pos x="connsiteX0" y="connsiteY0"/>
+              </a:cxn>
+              <a:cxn ang="0">
+                <a:pos x="connsiteX1" y="connsiteY1"/>
+              </a:cxn>
+              <a:cxn ang="0">
+                <a:pos x="connsiteX2" y="connsiteY2"/>
+              </a:cxn>
+              <a:cxn ang="0">
+                <a:pos x="connsiteX3" y="connsiteY3"/>
+              </a:cxn>
+              <a:cxn ang="0">
+                <a:pos x="connsiteX4" y="connsiteY4"/>
+              </a:cxn>
+              <a:cxn ang="0">
+                <a:pos x="connsiteX5" y="connsiteY5"/>
+              </a:cxn>
+              <a:cxn ang="0">
+                <a:pos x="connsiteX6" y="connsiteY6"/>
+              </a:cxn>
+              <a:cxn ang="0">
+                <a:pos x="connsiteX7" y="connsiteY7"/>
+              </a:cxn>
+              <a:cxn ang="0">
+                <a:pos x="connsiteX8" y="connsiteY8"/>
+              </a:cxn>
+              <a:cxn ang="0">
+                <a:pos x="connsiteX9" y="connsiteY9"/>
+              </a:cxn>
+            </a:cxnLst>
+            <a:rect l="l" t="t" r="r" b="b"/>
+            <a:pathLst>
+              <a:path w="9963150" h="6858000">
+                <a:moveTo>
+                  <a:pt x="1595771" y="0"/>
+                </a:moveTo>
+                <a:lnTo>
+                  <a:pt x="8367379" y="0"/>
+                </a:lnTo>
+                <a:lnTo>
+                  <a:pt x="8504080" y="130333"/>
+                </a:lnTo>
+                <a:cubicBezTo>
+                  <a:pt x="9405568" y="1031820"/>
+                  <a:pt x="9963150" y="2277214"/>
+                  <a:pt x="9963150" y="3652838"/>
+                </a:cubicBezTo>
+                <a:cubicBezTo>
+                  <a:pt x="9963150" y="4856509"/>
+                  <a:pt x="9536251" y="5960473"/>
+                  <a:pt x="8825600" y="6821583"/>
+                </a:cubicBezTo>
+                <a:lnTo>
+                  <a:pt x="8794055" y="6858000"/>
+                </a:lnTo>
+                <a:lnTo>
+                  <a:pt x="1169096" y="6858000"/>
+                </a:lnTo>
+                <a:lnTo>
+                  <a:pt x="1137550" y="6821583"/>
+                </a:lnTo>
+                <a:cubicBezTo>
+                  <a:pt x="426899" y="5960473"/>
+                  <a:pt x="0" y="4856509"/>
+                  <a:pt x="0" y="3652838"/>
+                </a:cubicBezTo>
+                <a:cubicBezTo>
+                  <a:pt x="0" y="2277214"/>
+                  <a:pt x="557582" y="1031820"/>
+                  <a:pt x="1459070" y="130333"/>
+                </a:cubicBezTo>
+                <a:close/>
+              </a:path>
+            </a:pathLst>
+          </a:custGeom>
+          <a:ln w="9525">
+            <a:solidFill>
+              <a:srgbClr val="EFEFEF"/>
+            </a:solidFill>
+          </a:ln>
+          <a:effectLst>
+            <a:outerShdw blurRad="139700" sx="102000" sy="102000" algn="ctr" rotWithShape="0">
+              <a:schemeClr val="bg1">
+                <a:lumMod val="85000"/>
+                <a:alpha val="38000"/>
+              </a:schemeClr>
+            </a:outerShdw>
+          </a:effectLst>
+        </p:spPr>
+        <p:style>
+          <a:lnRef idx="2">
+            <a:schemeClr val="accent1">
+              <a:shade val="50000"/>
+            </a:schemeClr>
+          </a:lnRef>
+          <a:fillRef idx="1">
+            <a:schemeClr val="accent1"/>
+          </a:fillRef>
+          <a:effectRef idx="0">
+            <a:schemeClr val="accent1"/>
+          </a:effectRef>
+          <a:fontRef idx="minor">
+            <a:schemeClr val="lt1"/>
+          </a:fontRef>
+        </p:style>
+        <p:txBody>
+          <a:bodyPr wrap="square" rtlCol="0" anchor="ctr">
+            <a:noAutofit/>
+          </a:bodyPr>
+          <a:lstStyle/>
+          <a:p>
+            <a:pPr algn="ctr" defTabSz="914400">
+              <a:defRPr/>
+            </a:pPr>
+            <a:endParaRPr lang="en-US">
+              <a:solidFill>
+                <a:prstClr val="white"/>
+              </a:solidFill>
+              <a:latin typeface="Calibri" panose="020F0502020204030204"/>
+            </a:endParaRPr>
+          </a:p>
+        </p:txBody>
+      </p:sp>
+      <p:sp useBgFill="1">
+        <p:nvSpPr>
+          <p:cNvPr id="11" name="Freeform: Shape 10">
+            <a:extLst>
+              <a:ext uri="{FF2B5EF4-FFF2-40B4-BE49-F238E27FC236}">
+                <a16:creationId xmlns:a16="http://schemas.microsoft.com/office/drawing/2014/main" id="{C7F28D52-2A5F-4D23-81AE-7CB8B591C7AF}"/>
+              </a:ext>
+              <a:ext uri="{C183D7F6-B498-43B3-948B-1728B52AA6E4}">
+                <adec:decorative xmlns:adec="http://schemas.microsoft.com/office/drawing/2017/decorative" val="1"/>
+              </a:ext>
+            </a:extLst>
+          </p:cNvPr>
+          <p:cNvSpPr>
+            <a:spLocks noGrp="1" noRot="1" noChangeAspect="1" noMove="1" noResize="1" noEditPoints="1" noAdjustHandles="1" noChangeArrowheads="1" noChangeShapeType="1" noTextEdit="1"/>
+          </p:cNvSpPr>
+          <p:nvPr>
+            <p:extLst>
+              <p:ext uri="{386F3935-93C4-4BCD-93E2-E3B085C9AB24}">
+                <p16:designElem xmlns:p16="http://schemas.microsoft.com/office/powerpoint/2015/main" val="1"/>
+              </p:ext>
+            </p:extLst>
+          </p:nvPr>
+        </p:nvSpPr>
+        <p:spPr>
+          <a:xfrm>
+            <a:off x="1656061" y="0"/>
+            <a:ext cx="14688541" cy="10799762"/>
+          </a:xfrm>
+          <a:custGeom>
+            <a:avLst/>
+            <a:gdLst>
+              <a:gd name="connsiteX0" fmla="*/ 1595771 w 9963150"/>
+              <a:gd name="connsiteY0" fmla="*/ 0 h 6858000"/>
+              <a:gd name="connsiteX1" fmla="*/ 8367379 w 9963150"/>
+              <a:gd name="connsiteY1" fmla="*/ 0 h 6858000"/>
+              <a:gd name="connsiteX2" fmla="*/ 8504080 w 9963150"/>
+              <a:gd name="connsiteY2" fmla="*/ 130333 h 6858000"/>
+              <a:gd name="connsiteX3" fmla="*/ 9963150 w 9963150"/>
+              <a:gd name="connsiteY3" fmla="*/ 3652838 h 6858000"/>
+              <a:gd name="connsiteX4" fmla="*/ 8825600 w 9963150"/>
+              <a:gd name="connsiteY4" fmla="*/ 6821583 h 6858000"/>
+              <a:gd name="connsiteX5" fmla="*/ 8794055 w 9963150"/>
+              <a:gd name="connsiteY5" fmla="*/ 6858000 h 6858000"/>
+              <a:gd name="connsiteX6" fmla="*/ 1169096 w 9963150"/>
+              <a:gd name="connsiteY6" fmla="*/ 6858000 h 6858000"/>
+              <a:gd name="connsiteX7" fmla="*/ 1137550 w 9963150"/>
+              <a:gd name="connsiteY7" fmla="*/ 6821583 h 6858000"/>
+              <a:gd name="connsiteX8" fmla="*/ 0 w 9963150"/>
+              <a:gd name="connsiteY8" fmla="*/ 3652838 h 6858000"/>
+              <a:gd name="connsiteX9" fmla="*/ 1459070 w 9963150"/>
+              <a:gd name="connsiteY9" fmla="*/ 130333 h 6858000"/>
+            </a:gdLst>
+            <a:ahLst/>
+            <a:cxnLst>
+              <a:cxn ang="0">
+                <a:pos x="connsiteX0" y="connsiteY0"/>
+              </a:cxn>
+              <a:cxn ang="0">
+                <a:pos x="connsiteX1" y="connsiteY1"/>
+              </a:cxn>
+              <a:cxn ang="0">
+                <a:pos x="connsiteX2" y="connsiteY2"/>
+              </a:cxn>
+              <a:cxn ang="0">
+                <a:pos x="connsiteX3" y="connsiteY3"/>
+              </a:cxn>
+              <a:cxn ang="0">
+                <a:pos x="connsiteX4" y="connsiteY4"/>
+              </a:cxn>
+              <a:cxn ang="0">
+                <a:pos x="connsiteX5" y="connsiteY5"/>
+              </a:cxn>
+              <a:cxn ang="0">
+                <a:pos x="connsiteX6" y="connsiteY6"/>
+              </a:cxn>
+              <a:cxn ang="0">
+                <a:pos x="connsiteX7" y="connsiteY7"/>
+              </a:cxn>
+              <a:cxn ang="0">
+                <a:pos x="connsiteX8" y="connsiteY8"/>
+              </a:cxn>
+              <a:cxn ang="0">
+                <a:pos x="connsiteX9" y="connsiteY9"/>
+              </a:cxn>
+            </a:cxnLst>
+            <a:rect l="l" t="t" r="r" b="b"/>
+            <a:pathLst>
+              <a:path w="9963150" h="6858000">
+                <a:moveTo>
+                  <a:pt x="1595771" y="0"/>
+                </a:moveTo>
+                <a:lnTo>
+                  <a:pt x="8367379" y="0"/>
+                </a:lnTo>
+                <a:lnTo>
+                  <a:pt x="8504080" y="130333"/>
+                </a:lnTo>
+                <a:cubicBezTo>
+                  <a:pt x="9405568" y="1031820"/>
+                  <a:pt x="9963150" y="2277214"/>
+                  <a:pt x="9963150" y="3652838"/>
+                </a:cubicBezTo>
+                <a:cubicBezTo>
+                  <a:pt x="9963150" y="4856509"/>
+                  <a:pt x="9536251" y="5960473"/>
+                  <a:pt x="8825600" y="6821583"/>
+                </a:cubicBezTo>
+                <a:lnTo>
+                  <a:pt x="8794055" y="6858000"/>
+                </a:lnTo>
+                <a:lnTo>
+                  <a:pt x="1169096" y="6858000"/>
+                </a:lnTo>
+                <a:lnTo>
+                  <a:pt x="1137550" y="6821583"/>
+                </a:lnTo>
+                <a:cubicBezTo>
+                  <a:pt x="426899" y="5960473"/>
+                  <a:pt x="0" y="4856509"/>
+                  <a:pt x="0" y="3652838"/>
+                </a:cubicBezTo>
+                <a:cubicBezTo>
+                  <a:pt x="0" y="2277214"/>
+                  <a:pt x="557582" y="1031820"/>
+                  <a:pt x="1459070" y="130333"/>
+                </a:cubicBezTo>
+                <a:close/>
+              </a:path>
+            </a:pathLst>
+          </a:custGeom>
+          <a:ln w="9525">
+            <a:noFill/>
+          </a:ln>
+          <a:effectLst/>
+        </p:spPr>
+        <p:style>
+          <a:lnRef idx="2">
+            <a:schemeClr val="accent1">
+              <a:shade val="50000"/>
+            </a:schemeClr>
+          </a:lnRef>
+          <a:fillRef idx="1">
+            <a:schemeClr val="accent1"/>
+          </a:fillRef>
+          <a:effectRef idx="0">
+            <a:schemeClr val="accent1"/>
+          </a:effectRef>
+          <a:fontRef idx="minor">
+            <a:schemeClr val="lt1"/>
+          </a:fontRef>
+        </p:style>
+        <p:txBody>
+          <a:bodyPr wrap="square" rtlCol="0" anchor="ctr">
+            <a:noAutofit/>
+          </a:bodyPr>
+          <a:lstStyle/>
+          <a:p>
+            <a:pPr algn="ctr" defTabSz="914400">
+              <a:defRPr/>
+            </a:pPr>
+            <a:endParaRPr lang="en-US">
+              <a:solidFill>
+                <a:prstClr val="white"/>
+              </a:solidFill>
+              <a:latin typeface="Calibri" panose="020F0502020204030204"/>
+            </a:endParaRPr>
+          </a:p>
+        </p:txBody>
+      </p:sp>
       <p:sp>
         <p:nvSpPr>
           <p:cNvPr id="2" name="Title 1">
             <a:extLst>
               <a:ext uri="{FF2B5EF4-FFF2-40B4-BE49-F238E27FC236}">
-                <a16:creationId xmlns:a16="http://schemas.microsoft.com/office/drawing/2014/main" id="{FEB3C678-28B7-1B70-1162-247D06367404}"/>
+                <a16:creationId xmlns:a16="http://schemas.microsoft.com/office/drawing/2014/main" id="{53016344-037A-956D-4AEE-28FE903A2FCE}"/>
               </a:ext>
             </a:extLst>
           </p:cNvPr>
@@ -3611,31 +4195,201 @@
             <a:spLocks noGrp="1"/>
           </p:cNvSpPr>
           <p:nvPr>
-            <p:ph type="ctrTitle"/>
-          </p:nvPr>
-        </p:nvSpPr>
-        <p:spPr/>
-        <p:txBody>
-          <a:bodyPr/>
-          <a:lstStyle/>
-          <a:p>
-            <a:r>
-              <a:rPr lang="en-GB" dirty="0"/>
-              <a:t>DS PBA2 Flowchart and process flow</a:t>
-            </a:r>
+            <p:ph type="title"/>
+          </p:nvPr>
+        </p:nvSpPr>
+        <p:spPr>
+          <a:xfrm>
+            <a:off x="2250088" y="3148932"/>
+            <a:ext cx="13500497" cy="4352705"/>
+          </a:xfrm>
+        </p:spPr>
+        <p:txBody>
+          <a:bodyPr vert="horz" lIns="91440" tIns="45720" rIns="91440" bIns="45720" rtlCol="0" anchor="ctr">
+            <a:normAutofit/>
+          </a:bodyPr>
+          <a:lstStyle/>
+          <a:p>
+            <a:pPr algn="ctr" defTabSz="914400"/>
+            <a:r>
+              <a:rPr lang="en-US" sz="10900" dirty="0"/>
+              <a:t>MENG PROPOSED WORKFLOW</a:t>
+            </a:r>
+          </a:p>
+        </p:txBody>
+      </p:sp>
+      <p:sp>
+        <p:nvSpPr>
+          <p:cNvPr id="13" name="Rectangle 12">
+            <a:extLst>
+              <a:ext uri="{FF2B5EF4-FFF2-40B4-BE49-F238E27FC236}">
+                <a16:creationId xmlns:a16="http://schemas.microsoft.com/office/drawing/2014/main" id="{3629484E-3792-4B3D-89AD-7C8A1ED0E0D4}"/>
+              </a:ext>
+              <a:ext uri="{C183D7F6-B498-43B3-948B-1728B52AA6E4}">
+                <adec:decorative xmlns:adec="http://schemas.microsoft.com/office/drawing/2017/decorative" val="1"/>
+              </a:ext>
+            </a:extLst>
+          </p:cNvPr>
+          <p:cNvSpPr>
+            <a:spLocks noGrp="1" noRot="1" noChangeAspect="1" noMove="1" noResize="1" noEditPoints="1" noAdjustHandles="1" noChangeArrowheads="1" noChangeShapeType="1" noTextEdit="1"/>
+          </p:cNvSpPr>
+          <p:nvPr>
+            <p:extLst>
+              <p:ext uri="{386F3935-93C4-4BCD-93E2-E3B085C9AB24}">
+                <p16:designElem xmlns:p16="http://schemas.microsoft.com/office/powerpoint/2015/main" val="1"/>
+              </p:ext>
+            </p:extLst>
+          </p:nvPr>
+        </p:nvSpPr>
+        <p:spPr>
+          <a:xfrm>
+            <a:off x="5490202" y="8700261"/>
+            <a:ext cx="7020258" cy="43199"/>
+          </a:xfrm>
+          <a:prstGeom prst="rect">
+            <a:avLst/>
+          </a:prstGeom>
+          <a:solidFill>
+            <a:schemeClr val="accent2"/>
+          </a:solidFill>
+          <a:ln>
+            <a:noFill/>
+          </a:ln>
+        </p:spPr>
+        <p:style>
+          <a:lnRef idx="2">
+            <a:schemeClr val="accent1">
+              <a:shade val="50000"/>
+            </a:schemeClr>
+          </a:lnRef>
+          <a:fillRef idx="1">
+            <a:schemeClr val="accent1"/>
+          </a:fillRef>
+          <a:effectRef idx="0">
+            <a:schemeClr val="accent1"/>
+          </a:effectRef>
+          <a:fontRef idx="minor">
+            <a:schemeClr val="lt1"/>
+          </a:fontRef>
+        </p:style>
+        <p:txBody>
+          <a:bodyPr rtlCol="0" anchor="ctr"/>
+          <a:lstStyle/>
+          <a:p>
+            <a:pPr algn="ctr" defTabSz="914400">
+              <a:defRPr/>
+            </a:pPr>
+            <a:endParaRPr lang="en-US">
+              <a:solidFill>
+                <a:prstClr val="white"/>
+              </a:solidFill>
+              <a:latin typeface="Calibri" panose="020F0502020204030204"/>
+            </a:endParaRPr>
           </a:p>
         </p:txBody>
       </p:sp>
     </p:spTree>
     <p:extLst>
       <p:ext uri="{BB962C8B-B14F-4D97-AF65-F5344CB8AC3E}">
-        <p14:creationId xmlns:p14="http://schemas.microsoft.com/office/powerpoint/2010/main" val="812916485"/>
+        <p14:creationId xmlns:p14="http://schemas.microsoft.com/office/powerpoint/2010/main" val="3854110332"/>
       </p:ext>
     </p:extLst>
   </p:cSld>
   <p:clrMapOvr>
     <a:masterClrMapping/>
   </p:clrMapOvr>
+  <p:timing>
+    <p:tnLst>
+      <p:par>
+        <p:cTn id="1" dur="indefinite" restart="never" nodeType="tmRoot">
+          <p:childTnLst>
+            <p:seq concurrent="1" nextAc="seek">
+              <p:cTn id="2" dur="indefinite" nodeType="mainSeq">
+                <p:childTnLst>
+                  <p:par>
+                    <p:cTn id="3" fill="hold">
+                      <p:stCondLst>
+                        <p:cond delay="indefinite"/>
+                        <p:cond evt="onBegin" delay="0">
+                          <p:tn val="2"/>
+                        </p:cond>
+                      </p:stCondLst>
+                      <p:childTnLst>
+                        <p:par>
+                          <p:cTn id="4" fill="hold">
+                            <p:stCondLst>
+                              <p:cond delay="0"/>
+                            </p:stCondLst>
+                            <p:childTnLst>
+                              <p:par>
+                                <p:cTn id="5" presetID="10" presetClass="entr" presetSubtype="0" fill="hold" grpId="0" nodeType="withEffect">
+                                  <p:stCondLst>
+                                    <p:cond delay="500"/>
+                                  </p:stCondLst>
+                                  <p:iterate>
+                                    <p:tmPct val="10000"/>
+                                  </p:iterate>
+                                  <p:childTnLst>
+                                    <p:set>
+                                      <p:cBhvr>
+                                        <p:cTn id="6" dur="1" fill="hold">
+                                          <p:stCondLst>
+                                            <p:cond delay="0"/>
+                                          </p:stCondLst>
+                                        </p:cTn>
+                                        <p:tgtEl>
+                                          <p:spTgt spid="2"/>
+                                        </p:tgtEl>
+                                        <p:attrNameLst>
+                                          <p:attrName>style.visibility</p:attrName>
+                                        </p:attrNameLst>
+                                      </p:cBhvr>
+                                      <p:to>
+                                        <p:strVal val="visible"/>
+                                      </p:to>
+                                    </p:set>
+                                    <p:animEffect transition="in" filter="fade">
+                                      <p:cBhvr>
+                                        <p:cTn id="7" dur="700"/>
+                                        <p:tgtEl>
+                                          <p:spTgt spid="2"/>
+                                        </p:tgtEl>
+                                      </p:cBhvr>
+                                    </p:animEffect>
+                                  </p:childTnLst>
+                                </p:cTn>
+                              </p:par>
+                            </p:childTnLst>
+                          </p:cTn>
+                        </p:par>
+                      </p:childTnLst>
+                    </p:cTn>
+                  </p:par>
+                </p:childTnLst>
+              </p:cTn>
+              <p:prevCondLst>
+                <p:cond evt="onPrev" delay="0">
+                  <p:tgtEl>
+                    <p:sldTgt/>
+                  </p:tgtEl>
+                </p:cond>
+              </p:prevCondLst>
+              <p:nextCondLst>
+                <p:cond evt="onNext" delay="0">
+                  <p:tgtEl>
+                    <p:sldTgt/>
+                  </p:tgtEl>
+                </p:cond>
+              </p:nextCondLst>
+            </p:seq>
+          </p:childTnLst>
+        </p:cTn>
+      </p:par>
+    </p:tnLst>
+    <p:bldLst>
+      <p:bldP spid="2" grpId="0"/>
+    </p:bldLst>
+  </p:timing>
 </p:sld>
 </file>
 
@@ -3670,23 +4424,21 @@
           </p:cNvPicPr>
           <p:nvPr/>
         </p:nvPicPr>
-        <p:blipFill>
-          <a:blip r:embed="rId2">
+        <p:blipFill rotWithShape="1">
+          <a:blip r:embed="rId3">
             <a:extLst>
               <a:ext uri="{28A0092B-C50C-407E-A947-70E740481C1C}">
                 <a14:useLocalDpi xmlns:a14="http://schemas.microsoft.com/office/drawing/2010/main" val="0"/>
               </a:ext>
             </a:extLst>
           </a:blip>
-          <a:srcRect/>
-          <a:stretch>
-            <a:fillRect/>
-          </a:stretch>
+          <a:srcRect t="48538"/>
+          <a:stretch/>
         </p:blipFill>
         <p:spPr bwMode="auto">
           <a:xfrm>
-            <a:off x="4794253" y="1620047"/>
-            <a:ext cx="8412163" cy="7559675"/>
+            <a:off x="728542" y="1528853"/>
+            <a:ext cx="16543578" cy="7650867"/>
           </a:xfrm>
           <a:prstGeom prst="rect">
             <a:avLst/>
@@ -3706,7 +4458,7 @@
     </p:spTree>
     <p:extLst>
       <p:ext uri="{BB962C8B-B14F-4D97-AF65-F5344CB8AC3E}">
-        <p14:creationId xmlns:p14="http://schemas.microsoft.com/office/powerpoint/2010/main" val="3857123147"/>
+        <p14:creationId xmlns:p14="http://schemas.microsoft.com/office/powerpoint/2010/main" val="4089258376"/>
       </p:ext>
     </p:extLst>
   </p:cSld>
@@ -3733,81 +4485,6 @@
           <a:chExt cx="0" cy="0"/>
         </a:xfrm>
       </p:grpSpPr>
-      <p:pic>
-        <p:nvPicPr>
-          <p:cNvPr id="1026" name="Picture 2">
-            <a:extLst>
-              <a:ext uri="{FF2B5EF4-FFF2-40B4-BE49-F238E27FC236}">
-                <a16:creationId xmlns:a16="http://schemas.microsoft.com/office/drawing/2014/main" id="{1DEC3A25-DD7C-455D-830F-F5177067A59B}"/>
-              </a:ext>
-            </a:extLst>
-          </p:cNvPr>
-          <p:cNvPicPr>
-            <a:picLocks noChangeAspect="1" noChangeArrowheads="1"/>
-          </p:cNvPicPr>
-          <p:nvPr/>
-        </p:nvPicPr>
-        <p:blipFill rotWithShape="1">
-          <a:blip r:embed="rId3">
-            <a:extLst>
-              <a:ext uri="{28A0092B-C50C-407E-A947-70E740481C1C}">
-                <a14:useLocalDpi xmlns:a14="http://schemas.microsoft.com/office/drawing/2010/main" val="0"/>
-              </a:ext>
-            </a:extLst>
-          </a:blip>
-          <a:srcRect t="48538"/>
-          <a:stretch/>
-        </p:blipFill>
-        <p:spPr bwMode="auto">
-          <a:xfrm>
-            <a:off x="728542" y="1528853"/>
-            <a:ext cx="16543578" cy="7650867"/>
-          </a:xfrm>
-          <a:prstGeom prst="rect">
-            <a:avLst/>
-          </a:prstGeom>
-          <a:noFill/>
-          <a:extLst>
-            <a:ext uri="{909E8E84-426E-40DD-AFC4-6F175D3DCCD1}">
-              <a14:hiddenFill xmlns:a14="http://schemas.microsoft.com/office/drawing/2010/main">
-                <a:solidFill>
-                  <a:srgbClr val="FFFFFF"/>
-                </a:solidFill>
-              </a14:hiddenFill>
-            </a:ext>
-          </a:extLst>
-        </p:spPr>
-      </p:pic>
-    </p:spTree>
-    <p:extLst>
-      <p:ext uri="{BB962C8B-B14F-4D97-AF65-F5344CB8AC3E}">
-        <p14:creationId xmlns:p14="http://schemas.microsoft.com/office/powerpoint/2010/main" val="4089258376"/>
-      </p:ext>
-    </p:extLst>
-  </p:cSld>
-  <p:clrMapOvr>
-    <a:masterClrMapping/>
-  </p:clrMapOvr>
-</p:sld>
-</file>
-
-<file path=ppt/slides/slide4.xml><?xml version="1.0" encoding="utf-8"?>
-<p:sld xmlns:a="http://schemas.openxmlformats.org/drawingml/2006/main" xmlns:r="http://schemas.openxmlformats.org/officeDocument/2006/relationships" xmlns:p="http://schemas.openxmlformats.org/presentationml/2006/main">
-  <p:cSld>
-    <p:spTree>
-      <p:nvGrpSpPr>
-        <p:cNvPr id="1" name=""/>
-        <p:cNvGrpSpPr/>
-        <p:nvPr/>
-      </p:nvGrpSpPr>
-      <p:grpSpPr>
-        <a:xfrm>
-          <a:off x="0" y="0"/>
-          <a:ext cx="0" cy="0"/>
-          <a:chOff x="0" y="0"/>
-          <a:chExt cx="0" cy="0"/>
-        </a:xfrm>
-      </p:grpSpPr>
       <p:sp>
         <p:nvSpPr>
           <p:cNvPr id="2" name="Rectangle 1">
@@ -3971,7 +4648,7 @@
         </p:blipFill>
         <p:spPr>
           <a:xfrm>
-            <a:off x="4635061" y="7897049"/>
+            <a:off x="4635061" y="7897051"/>
             <a:ext cx="7772400" cy="2830285"/>
           </a:xfrm>
           <a:prstGeom prst="rect">
@@ -3998,7 +4675,7 @@
         </p:nvSpPr>
         <p:spPr>
           <a:xfrm>
-            <a:off x="6185917" y="2028381"/>
+            <a:off x="6185917" y="2028383"/>
             <a:ext cx="1215342" cy="701401"/>
           </a:xfrm>
           <a:prstGeom prst="rect">
@@ -4052,7 +4729,7 @@
         </p:nvSpPr>
         <p:spPr>
           <a:xfrm>
-            <a:off x="6157357" y="2857552"/>
+            <a:off x="6157357" y="2857554"/>
             <a:ext cx="1215342" cy="701401"/>
           </a:xfrm>
           <a:prstGeom prst="rect">
@@ -4106,7 +4783,7 @@
         </p:nvSpPr>
         <p:spPr>
           <a:xfrm>
-            <a:off x="6157357" y="3788088"/>
+            <a:off x="6157357" y="3788090"/>
             <a:ext cx="1215342" cy="701401"/>
           </a:xfrm>
           <a:prstGeom prst="rect">
@@ -4393,7 +5070,7 @@
         </p:nvSpPr>
         <p:spPr>
           <a:xfrm>
-            <a:off x="4894801" y="1997406"/>
+            <a:off x="4894801" y="1997408"/>
             <a:ext cx="1215342" cy="461665"/>
           </a:xfrm>
           <a:prstGeom prst="rect">
@@ -4428,7 +5105,7 @@
         </p:nvSpPr>
         <p:spPr>
           <a:xfrm>
-            <a:off x="4856334" y="2836395"/>
+            <a:off x="4856334" y="2836397"/>
             <a:ext cx="1215342" cy="461665"/>
           </a:xfrm>
           <a:prstGeom prst="rect">
@@ -4463,7 +5140,7 @@
         </p:nvSpPr>
         <p:spPr>
           <a:xfrm>
-            <a:off x="4942015" y="3678821"/>
+            <a:off x="4942015" y="3678823"/>
             <a:ext cx="1215342" cy="461665"/>
           </a:xfrm>
           <a:prstGeom prst="rect">
@@ -4498,7 +5175,7 @@
         </p:nvSpPr>
         <p:spPr>
           <a:xfrm>
-            <a:off x="8515655" y="2894503"/>
+            <a:off x="8515655" y="2894505"/>
             <a:ext cx="1215342" cy="701401"/>
           </a:xfrm>
           <a:prstGeom prst="plaque">
@@ -4545,7 +5222,7 @@
         </p:nvSpPr>
         <p:spPr>
           <a:xfrm>
-            <a:off x="11417998" y="5499743"/>
+            <a:off x="11418000" y="5499745"/>
             <a:ext cx="989463" cy="954527"/>
           </a:xfrm>
           <a:prstGeom prst="hexagon">
@@ -4717,7 +5394,7 @@
         </p:nvCxnSpPr>
         <p:spPr>
           <a:xfrm flipV="1">
-            <a:off x="7372699" y="3245204"/>
+            <a:off x="7372699" y="3245206"/>
             <a:ext cx="1142956" cy="893585"/>
           </a:xfrm>
           <a:prstGeom prst="line">
@@ -4753,7 +5430,7 @@
         </p:nvSpPr>
         <p:spPr>
           <a:xfrm>
-            <a:off x="10371134" y="2382919"/>
+            <a:off x="10371134" y="2382921"/>
             <a:ext cx="1215342" cy="701401"/>
           </a:xfrm>
           <a:prstGeom prst="rect">
@@ -4800,7 +5477,7 @@
         </p:nvSpPr>
         <p:spPr>
           <a:xfrm>
-            <a:off x="10371134" y="3084320"/>
+            <a:off x="10371134" y="3084322"/>
             <a:ext cx="1215342" cy="701401"/>
           </a:xfrm>
           <a:prstGeom prst="rect">
@@ -4847,7 +5524,7 @@
         </p:nvSpPr>
         <p:spPr>
           <a:xfrm>
-            <a:off x="10371134" y="3785721"/>
+            <a:off x="10371134" y="3785723"/>
             <a:ext cx="1215342" cy="701401"/>
           </a:xfrm>
           <a:prstGeom prst="rect">
@@ -4968,7 +5645,7 @@
         </p:nvCxnSpPr>
         <p:spPr>
           <a:xfrm flipV="1">
-            <a:off x="11417997" y="3447270"/>
+            <a:off x="11417997" y="3447272"/>
             <a:ext cx="1142956" cy="893585"/>
           </a:xfrm>
           <a:prstGeom prst="line">
@@ -5004,7 +5681,7 @@
         </p:nvSpPr>
         <p:spPr>
           <a:xfrm>
-            <a:off x="11106058" y="5109813"/>
+            <a:off x="11106060" y="5109815"/>
             <a:ext cx="2837543" cy="1732769"/>
           </a:xfrm>
           <a:prstGeom prst="rect">
@@ -5187,7 +5864,7 @@
         </p:nvCxnSpPr>
         <p:spPr>
           <a:xfrm>
-            <a:off x="12560953" y="3422770"/>
+            <a:off x="12560953" y="3422772"/>
             <a:ext cx="0" cy="1687043"/>
           </a:xfrm>
           <a:prstGeom prst="line">
@@ -5226,7 +5903,7 @@
         </p:nvCxnSpPr>
         <p:spPr>
           <a:xfrm flipV="1">
-            <a:off x="13943601" y="5961839"/>
+            <a:off x="13943603" y="5961839"/>
             <a:ext cx="1588183" cy="14358"/>
           </a:xfrm>
           <a:prstGeom prst="line">
@@ -5261,6 +5938,557 @@
 </p:sld>
 </file>
 
+<file path=ppt/slides/slide4.xml><?xml version="1.0" encoding="utf-8"?>
+<p:sld xmlns:a="http://schemas.openxmlformats.org/drawingml/2006/main" xmlns:r="http://schemas.openxmlformats.org/officeDocument/2006/relationships" xmlns:p="http://schemas.openxmlformats.org/presentationml/2006/main">
+  <p:cSld>
+    <p:bg>
+      <p:bgPr>
+        <a:solidFill>
+          <a:schemeClr val="bg1"/>
+        </a:solidFill>
+        <a:effectLst/>
+      </p:bgPr>
+    </p:bg>
+    <p:spTree>
+      <p:nvGrpSpPr>
+        <p:cNvPr id="1" name=""/>
+        <p:cNvGrpSpPr/>
+        <p:nvPr/>
+      </p:nvGrpSpPr>
+      <p:grpSpPr>
+        <a:xfrm>
+          <a:off x="0" y="0"/>
+          <a:ext cx="0" cy="0"/>
+          <a:chOff x="0" y="0"/>
+          <a:chExt cx="0" cy="0"/>
+        </a:xfrm>
+      </p:grpSpPr>
+      <p:sp useBgFill="1">
+        <p:nvSpPr>
+          <p:cNvPr id="7" name="Rectangle 6">
+            <a:extLst>
+              <a:ext uri="{FF2B5EF4-FFF2-40B4-BE49-F238E27FC236}">
+                <a16:creationId xmlns:a16="http://schemas.microsoft.com/office/drawing/2014/main" id="{FFD48BC7-DC40-47DE-87EE-9F4B6ECB9ABB}"/>
+              </a:ext>
+              <a:ext uri="{C183D7F6-B498-43B3-948B-1728B52AA6E4}">
+                <adec:decorative xmlns:adec="http://schemas.microsoft.com/office/drawing/2017/decorative" val="1"/>
+              </a:ext>
+            </a:extLst>
+          </p:cNvPr>
+          <p:cNvSpPr>
+            <a:spLocks noGrp="1" noRot="1" noChangeAspect="1" noMove="1" noResize="1" noEditPoints="1" noAdjustHandles="1" noChangeArrowheads="1" noChangeShapeType="1" noTextEdit="1"/>
+          </p:cNvSpPr>
+          <p:nvPr>
+            <p:extLst>
+              <p:ext uri="{386F3935-93C4-4BCD-93E2-E3B085C9AB24}">
+                <p16:designElem xmlns:p16="http://schemas.microsoft.com/office/powerpoint/2015/main" val="1"/>
+              </p:ext>
+            </p:extLst>
+          </p:nvPr>
+        </p:nvSpPr>
+        <p:spPr>
+          <a:xfrm>
+            <a:off x="0" y="0"/>
+            <a:ext cx="18000662" cy="10799762"/>
+          </a:xfrm>
+          <a:prstGeom prst="rect">
+            <a:avLst/>
+          </a:prstGeom>
+          <a:ln>
+            <a:noFill/>
+          </a:ln>
+        </p:spPr>
+        <p:style>
+          <a:lnRef idx="2">
+            <a:schemeClr val="accent1">
+              <a:shade val="50000"/>
+            </a:schemeClr>
+          </a:lnRef>
+          <a:fillRef idx="1">
+            <a:schemeClr val="accent1"/>
+          </a:fillRef>
+          <a:effectRef idx="0">
+            <a:schemeClr val="accent1"/>
+          </a:effectRef>
+          <a:fontRef idx="minor">
+            <a:schemeClr val="lt1"/>
+          </a:fontRef>
+        </p:style>
+        <p:txBody>
+          <a:bodyPr rtlCol="0" anchor="ctr"/>
+          <a:lstStyle/>
+          <a:p>
+            <a:pPr algn="ctr"/>
+            <a:endParaRPr lang="en-US"/>
+          </a:p>
+        </p:txBody>
+      </p:sp>
+      <p:sp useBgFill="1">
+        <p:nvSpPr>
+          <p:cNvPr id="9" name="Freeform: Shape 8">
+            <a:extLst>
+              <a:ext uri="{FF2B5EF4-FFF2-40B4-BE49-F238E27FC236}">
+                <a16:creationId xmlns:a16="http://schemas.microsoft.com/office/drawing/2014/main" id="{E502BBC7-2C76-46F3-BC24-5985BC13DB88}"/>
+              </a:ext>
+              <a:ext uri="{C183D7F6-B498-43B3-948B-1728B52AA6E4}">
+                <adec:decorative xmlns:adec="http://schemas.microsoft.com/office/drawing/2017/decorative" val="1"/>
+              </a:ext>
+            </a:extLst>
+          </p:cNvPr>
+          <p:cNvSpPr>
+            <a:spLocks noGrp="1" noRot="1" noChangeAspect="1" noMove="1" noResize="1" noEditPoints="1" noAdjustHandles="1" noChangeArrowheads="1" noChangeShapeType="1" noTextEdit="1"/>
+          </p:cNvSpPr>
+          <p:nvPr>
+            <p:extLst>
+              <p:ext uri="{386F3935-93C4-4BCD-93E2-E3B085C9AB24}">
+                <p16:designElem xmlns:p16="http://schemas.microsoft.com/office/powerpoint/2015/main" val="1"/>
+              </p:ext>
+            </p:extLst>
+          </p:nvPr>
+        </p:nvSpPr>
+        <p:spPr>
+          <a:xfrm>
+            <a:off x="1645373" y="0"/>
+            <a:ext cx="14709916" cy="10799762"/>
+          </a:xfrm>
+          <a:custGeom>
+            <a:avLst/>
+            <a:gdLst>
+              <a:gd name="connsiteX0" fmla="*/ 1595771 w 9963150"/>
+              <a:gd name="connsiteY0" fmla="*/ 0 h 6858000"/>
+              <a:gd name="connsiteX1" fmla="*/ 8367379 w 9963150"/>
+              <a:gd name="connsiteY1" fmla="*/ 0 h 6858000"/>
+              <a:gd name="connsiteX2" fmla="*/ 8504080 w 9963150"/>
+              <a:gd name="connsiteY2" fmla="*/ 130333 h 6858000"/>
+              <a:gd name="connsiteX3" fmla="*/ 9963150 w 9963150"/>
+              <a:gd name="connsiteY3" fmla="*/ 3652838 h 6858000"/>
+              <a:gd name="connsiteX4" fmla="*/ 8825600 w 9963150"/>
+              <a:gd name="connsiteY4" fmla="*/ 6821583 h 6858000"/>
+              <a:gd name="connsiteX5" fmla="*/ 8794055 w 9963150"/>
+              <a:gd name="connsiteY5" fmla="*/ 6858000 h 6858000"/>
+              <a:gd name="connsiteX6" fmla="*/ 1169096 w 9963150"/>
+              <a:gd name="connsiteY6" fmla="*/ 6858000 h 6858000"/>
+              <a:gd name="connsiteX7" fmla="*/ 1137550 w 9963150"/>
+              <a:gd name="connsiteY7" fmla="*/ 6821583 h 6858000"/>
+              <a:gd name="connsiteX8" fmla="*/ 0 w 9963150"/>
+              <a:gd name="connsiteY8" fmla="*/ 3652838 h 6858000"/>
+              <a:gd name="connsiteX9" fmla="*/ 1459070 w 9963150"/>
+              <a:gd name="connsiteY9" fmla="*/ 130333 h 6858000"/>
+            </a:gdLst>
+            <a:ahLst/>
+            <a:cxnLst>
+              <a:cxn ang="0">
+                <a:pos x="connsiteX0" y="connsiteY0"/>
+              </a:cxn>
+              <a:cxn ang="0">
+                <a:pos x="connsiteX1" y="connsiteY1"/>
+              </a:cxn>
+              <a:cxn ang="0">
+                <a:pos x="connsiteX2" y="connsiteY2"/>
+              </a:cxn>
+              <a:cxn ang="0">
+                <a:pos x="connsiteX3" y="connsiteY3"/>
+              </a:cxn>
+              <a:cxn ang="0">
+                <a:pos x="connsiteX4" y="connsiteY4"/>
+              </a:cxn>
+              <a:cxn ang="0">
+                <a:pos x="connsiteX5" y="connsiteY5"/>
+              </a:cxn>
+              <a:cxn ang="0">
+                <a:pos x="connsiteX6" y="connsiteY6"/>
+              </a:cxn>
+              <a:cxn ang="0">
+                <a:pos x="connsiteX7" y="connsiteY7"/>
+              </a:cxn>
+              <a:cxn ang="0">
+                <a:pos x="connsiteX8" y="connsiteY8"/>
+              </a:cxn>
+              <a:cxn ang="0">
+                <a:pos x="connsiteX9" y="connsiteY9"/>
+              </a:cxn>
+            </a:cxnLst>
+            <a:rect l="l" t="t" r="r" b="b"/>
+            <a:pathLst>
+              <a:path w="9963150" h="6858000">
+                <a:moveTo>
+                  <a:pt x="1595771" y="0"/>
+                </a:moveTo>
+                <a:lnTo>
+                  <a:pt x="8367379" y="0"/>
+                </a:lnTo>
+                <a:lnTo>
+                  <a:pt x="8504080" y="130333"/>
+                </a:lnTo>
+                <a:cubicBezTo>
+                  <a:pt x="9405568" y="1031820"/>
+                  <a:pt x="9963150" y="2277214"/>
+                  <a:pt x="9963150" y="3652838"/>
+                </a:cubicBezTo>
+                <a:cubicBezTo>
+                  <a:pt x="9963150" y="4856509"/>
+                  <a:pt x="9536251" y="5960473"/>
+                  <a:pt x="8825600" y="6821583"/>
+                </a:cubicBezTo>
+                <a:lnTo>
+                  <a:pt x="8794055" y="6858000"/>
+                </a:lnTo>
+                <a:lnTo>
+                  <a:pt x="1169096" y="6858000"/>
+                </a:lnTo>
+                <a:lnTo>
+                  <a:pt x="1137550" y="6821583"/>
+                </a:lnTo>
+                <a:cubicBezTo>
+                  <a:pt x="426899" y="5960473"/>
+                  <a:pt x="0" y="4856509"/>
+                  <a:pt x="0" y="3652838"/>
+                </a:cubicBezTo>
+                <a:cubicBezTo>
+                  <a:pt x="0" y="2277214"/>
+                  <a:pt x="557582" y="1031820"/>
+                  <a:pt x="1459070" y="130333"/>
+                </a:cubicBezTo>
+                <a:close/>
+              </a:path>
+            </a:pathLst>
+          </a:custGeom>
+          <a:ln w="9525">
+            <a:solidFill>
+              <a:srgbClr val="EFEFEF"/>
+            </a:solidFill>
+          </a:ln>
+          <a:effectLst>
+            <a:outerShdw blurRad="139700" sx="102000" sy="102000" algn="ctr" rotWithShape="0">
+              <a:schemeClr val="bg1">
+                <a:lumMod val="85000"/>
+                <a:alpha val="38000"/>
+              </a:schemeClr>
+            </a:outerShdw>
+          </a:effectLst>
+        </p:spPr>
+        <p:style>
+          <a:lnRef idx="2">
+            <a:schemeClr val="accent1">
+              <a:shade val="50000"/>
+            </a:schemeClr>
+          </a:lnRef>
+          <a:fillRef idx="1">
+            <a:schemeClr val="accent1"/>
+          </a:fillRef>
+          <a:effectRef idx="0">
+            <a:schemeClr val="accent1"/>
+          </a:effectRef>
+          <a:fontRef idx="minor">
+            <a:schemeClr val="lt1"/>
+          </a:fontRef>
+        </p:style>
+        <p:txBody>
+          <a:bodyPr wrap="square" rtlCol="0" anchor="ctr">
+            <a:noAutofit/>
+          </a:bodyPr>
+          <a:lstStyle/>
+          <a:p>
+            <a:pPr algn="ctr" defTabSz="914400">
+              <a:defRPr/>
+            </a:pPr>
+            <a:endParaRPr lang="en-US">
+              <a:solidFill>
+                <a:prstClr val="white"/>
+              </a:solidFill>
+              <a:latin typeface="Calibri" panose="020F0502020204030204"/>
+            </a:endParaRPr>
+          </a:p>
+        </p:txBody>
+      </p:sp>
+      <p:sp useBgFill="1">
+        <p:nvSpPr>
+          <p:cNvPr id="11" name="Freeform: Shape 10">
+            <a:extLst>
+              <a:ext uri="{FF2B5EF4-FFF2-40B4-BE49-F238E27FC236}">
+                <a16:creationId xmlns:a16="http://schemas.microsoft.com/office/drawing/2014/main" id="{C7F28D52-2A5F-4D23-81AE-7CB8B591C7AF}"/>
+              </a:ext>
+              <a:ext uri="{C183D7F6-B498-43B3-948B-1728B52AA6E4}">
+                <adec:decorative xmlns:adec="http://schemas.microsoft.com/office/drawing/2017/decorative" val="1"/>
+              </a:ext>
+            </a:extLst>
+          </p:cNvPr>
+          <p:cNvSpPr>
+            <a:spLocks noGrp="1" noRot="1" noChangeAspect="1" noMove="1" noResize="1" noEditPoints="1" noAdjustHandles="1" noChangeArrowheads="1" noChangeShapeType="1" noTextEdit="1"/>
+          </p:cNvSpPr>
+          <p:nvPr>
+            <p:extLst>
+              <p:ext uri="{386F3935-93C4-4BCD-93E2-E3B085C9AB24}">
+                <p16:designElem xmlns:p16="http://schemas.microsoft.com/office/powerpoint/2015/main" val="1"/>
+              </p:ext>
+            </p:extLst>
+          </p:nvPr>
+        </p:nvSpPr>
+        <p:spPr>
+          <a:xfrm>
+            <a:off x="1656061" y="0"/>
+            <a:ext cx="14688541" cy="10799762"/>
+          </a:xfrm>
+          <a:custGeom>
+            <a:avLst/>
+            <a:gdLst>
+              <a:gd name="connsiteX0" fmla="*/ 1595771 w 9963150"/>
+              <a:gd name="connsiteY0" fmla="*/ 0 h 6858000"/>
+              <a:gd name="connsiteX1" fmla="*/ 8367379 w 9963150"/>
+              <a:gd name="connsiteY1" fmla="*/ 0 h 6858000"/>
+              <a:gd name="connsiteX2" fmla="*/ 8504080 w 9963150"/>
+              <a:gd name="connsiteY2" fmla="*/ 130333 h 6858000"/>
+              <a:gd name="connsiteX3" fmla="*/ 9963150 w 9963150"/>
+              <a:gd name="connsiteY3" fmla="*/ 3652838 h 6858000"/>
+              <a:gd name="connsiteX4" fmla="*/ 8825600 w 9963150"/>
+              <a:gd name="connsiteY4" fmla="*/ 6821583 h 6858000"/>
+              <a:gd name="connsiteX5" fmla="*/ 8794055 w 9963150"/>
+              <a:gd name="connsiteY5" fmla="*/ 6858000 h 6858000"/>
+              <a:gd name="connsiteX6" fmla="*/ 1169096 w 9963150"/>
+              <a:gd name="connsiteY6" fmla="*/ 6858000 h 6858000"/>
+              <a:gd name="connsiteX7" fmla="*/ 1137550 w 9963150"/>
+              <a:gd name="connsiteY7" fmla="*/ 6821583 h 6858000"/>
+              <a:gd name="connsiteX8" fmla="*/ 0 w 9963150"/>
+              <a:gd name="connsiteY8" fmla="*/ 3652838 h 6858000"/>
+              <a:gd name="connsiteX9" fmla="*/ 1459070 w 9963150"/>
+              <a:gd name="connsiteY9" fmla="*/ 130333 h 6858000"/>
+            </a:gdLst>
+            <a:ahLst/>
+            <a:cxnLst>
+              <a:cxn ang="0">
+                <a:pos x="connsiteX0" y="connsiteY0"/>
+              </a:cxn>
+              <a:cxn ang="0">
+                <a:pos x="connsiteX1" y="connsiteY1"/>
+              </a:cxn>
+              <a:cxn ang="0">
+                <a:pos x="connsiteX2" y="connsiteY2"/>
+              </a:cxn>
+              <a:cxn ang="0">
+                <a:pos x="connsiteX3" y="connsiteY3"/>
+              </a:cxn>
+              <a:cxn ang="0">
+                <a:pos x="connsiteX4" y="connsiteY4"/>
+              </a:cxn>
+              <a:cxn ang="0">
+                <a:pos x="connsiteX5" y="connsiteY5"/>
+              </a:cxn>
+              <a:cxn ang="0">
+                <a:pos x="connsiteX6" y="connsiteY6"/>
+              </a:cxn>
+              <a:cxn ang="0">
+                <a:pos x="connsiteX7" y="connsiteY7"/>
+              </a:cxn>
+              <a:cxn ang="0">
+                <a:pos x="connsiteX8" y="connsiteY8"/>
+              </a:cxn>
+              <a:cxn ang="0">
+                <a:pos x="connsiteX9" y="connsiteY9"/>
+              </a:cxn>
+            </a:cxnLst>
+            <a:rect l="l" t="t" r="r" b="b"/>
+            <a:pathLst>
+              <a:path w="9963150" h="6858000">
+                <a:moveTo>
+                  <a:pt x="1595771" y="0"/>
+                </a:moveTo>
+                <a:lnTo>
+                  <a:pt x="8367379" y="0"/>
+                </a:lnTo>
+                <a:lnTo>
+                  <a:pt x="8504080" y="130333"/>
+                </a:lnTo>
+                <a:cubicBezTo>
+                  <a:pt x="9405568" y="1031820"/>
+                  <a:pt x="9963150" y="2277214"/>
+                  <a:pt x="9963150" y="3652838"/>
+                </a:cubicBezTo>
+                <a:cubicBezTo>
+                  <a:pt x="9963150" y="4856509"/>
+                  <a:pt x="9536251" y="5960473"/>
+                  <a:pt x="8825600" y="6821583"/>
+                </a:cubicBezTo>
+                <a:lnTo>
+                  <a:pt x="8794055" y="6858000"/>
+                </a:lnTo>
+                <a:lnTo>
+                  <a:pt x="1169096" y="6858000"/>
+                </a:lnTo>
+                <a:lnTo>
+                  <a:pt x="1137550" y="6821583"/>
+                </a:lnTo>
+                <a:cubicBezTo>
+                  <a:pt x="426899" y="5960473"/>
+                  <a:pt x="0" y="4856509"/>
+                  <a:pt x="0" y="3652838"/>
+                </a:cubicBezTo>
+                <a:cubicBezTo>
+                  <a:pt x="0" y="2277214"/>
+                  <a:pt x="557582" y="1031820"/>
+                  <a:pt x="1459070" y="130333"/>
+                </a:cubicBezTo>
+                <a:close/>
+              </a:path>
+            </a:pathLst>
+          </a:custGeom>
+          <a:ln w="9525">
+            <a:noFill/>
+          </a:ln>
+          <a:effectLst/>
+        </p:spPr>
+        <p:style>
+          <a:lnRef idx="2">
+            <a:schemeClr val="accent1">
+              <a:shade val="50000"/>
+            </a:schemeClr>
+          </a:lnRef>
+          <a:fillRef idx="1">
+            <a:schemeClr val="accent1"/>
+          </a:fillRef>
+          <a:effectRef idx="0">
+            <a:schemeClr val="accent1"/>
+          </a:effectRef>
+          <a:fontRef idx="minor">
+            <a:schemeClr val="lt1"/>
+          </a:fontRef>
+        </p:style>
+        <p:txBody>
+          <a:bodyPr wrap="square" rtlCol="0" anchor="ctr">
+            <a:noAutofit/>
+          </a:bodyPr>
+          <a:lstStyle/>
+          <a:p>
+            <a:pPr algn="ctr" defTabSz="914400">
+              <a:defRPr/>
+            </a:pPr>
+            <a:endParaRPr lang="en-US">
+              <a:solidFill>
+                <a:prstClr val="white"/>
+              </a:solidFill>
+              <a:latin typeface="Calibri" panose="020F0502020204030204"/>
+            </a:endParaRPr>
+          </a:p>
+        </p:txBody>
+      </p:sp>
+      <p:sp>
+        <p:nvSpPr>
+          <p:cNvPr id="2" name="Title 1">
+            <a:extLst>
+              <a:ext uri="{FF2B5EF4-FFF2-40B4-BE49-F238E27FC236}">
+                <a16:creationId xmlns:a16="http://schemas.microsoft.com/office/drawing/2014/main" id="{53016344-037A-956D-4AEE-28FE903A2FCE}"/>
+              </a:ext>
+            </a:extLst>
+          </p:cNvPr>
+          <p:cNvSpPr>
+            <a:spLocks noGrp="1"/>
+          </p:cNvSpPr>
+          <p:nvPr>
+            <p:ph type="title"/>
+          </p:nvPr>
+        </p:nvSpPr>
+        <p:spPr>
+          <a:xfrm>
+            <a:off x="2250088" y="3148932"/>
+            <a:ext cx="13500497" cy="4352705"/>
+          </a:xfrm>
+        </p:spPr>
+        <p:txBody>
+          <a:bodyPr vert="horz" lIns="91440" tIns="45720" rIns="91440" bIns="45720" rtlCol="0" anchor="ctr">
+            <a:normAutofit/>
+          </a:bodyPr>
+          <a:lstStyle/>
+          <a:p>
+            <a:pPr algn="ctr" defTabSz="914400"/>
+            <a:r>
+              <a:rPr lang="en-US" sz="10900" dirty="0"/>
+              <a:t>MENG MISSING DATA FLOW CHART</a:t>
+            </a:r>
+          </a:p>
+        </p:txBody>
+      </p:sp>
+      <p:sp>
+        <p:nvSpPr>
+          <p:cNvPr id="13" name="Rectangle 12">
+            <a:extLst>
+              <a:ext uri="{FF2B5EF4-FFF2-40B4-BE49-F238E27FC236}">
+                <a16:creationId xmlns:a16="http://schemas.microsoft.com/office/drawing/2014/main" id="{3629484E-3792-4B3D-89AD-7C8A1ED0E0D4}"/>
+              </a:ext>
+              <a:ext uri="{C183D7F6-B498-43B3-948B-1728B52AA6E4}">
+                <adec:decorative xmlns:adec="http://schemas.microsoft.com/office/drawing/2017/decorative" val="1"/>
+              </a:ext>
+            </a:extLst>
+          </p:cNvPr>
+          <p:cNvSpPr>
+            <a:spLocks noGrp="1" noRot="1" noChangeAspect="1" noMove="1" noResize="1" noEditPoints="1" noAdjustHandles="1" noChangeArrowheads="1" noChangeShapeType="1" noTextEdit="1"/>
+          </p:cNvSpPr>
+          <p:nvPr>
+            <p:extLst>
+              <p:ext uri="{386F3935-93C4-4BCD-93E2-E3B085C9AB24}">
+                <p16:designElem xmlns:p16="http://schemas.microsoft.com/office/powerpoint/2015/main" val="1"/>
+              </p:ext>
+            </p:extLst>
+          </p:nvPr>
+        </p:nvSpPr>
+        <p:spPr>
+          <a:xfrm>
+            <a:off x="5490202" y="8700261"/>
+            <a:ext cx="7020258" cy="43199"/>
+          </a:xfrm>
+          <a:prstGeom prst="rect">
+            <a:avLst/>
+          </a:prstGeom>
+          <a:solidFill>
+            <a:schemeClr val="accent2"/>
+          </a:solidFill>
+          <a:ln>
+            <a:noFill/>
+          </a:ln>
+        </p:spPr>
+        <p:style>
+          <a:lnRef idx="2">
+            <a:schemeClr val="accent1">
+              <a:shade val="50000"/>
+            </a:schemeClr>
+          </a:lnRef>
+          <a:fillRef idx="1">
+            <a:schemeClr val="accent1"/>
+          </a:fillRef>
+          <a:effectRef idx="0">
+            <a:schemeClr val="accent1"/>
+          </a:effectRef>
+          <a:fontRef idx="minor">
+            <a:schemeClr val="lt1"/>
+          </a:fontRef>
+        </p:style>
+        <p:txBody>
+          <a:bodyPr rtlCol="0" anchor="ctr"/>
+          <a:lstStyle/>
+          <a:p>
+            <a:pPr algn="ctr" defTabSz="914400">
+              <a:defRPr/>
+            </a:pPr>
+            <a:endParaRPr lang="en-US">
+              <a:solidFill>
+                <a:prstClr val="white"/>
+              </a:solidFill>
+              <a:latin typeface="Calibri" panose="020F0502020204030204"/>
+            </a:endParaRPr>
+          </a:p>
+        </p:txBody>
+      </p:sp>
+    </p:spTree>
+    <p:extLst>
+      <p:ext uri="{BB962C8B-B14F-4D97-AF65-F5344CB8AC3E}">
+        <p14:creationId xmlns:p14="http://schemas.microsoft.com/office/powerpoint/2010/main" val="4003537842"/>
+      </p:ext>
+    </p:extLst>
+  </p:cSld>
+  <p:clrMapOvr>
+    <a:masterClrMapping/>
+  </p:clrMapOvr>
+</p:sld>
+</file>
+
 <file path=ppt/slides/slide5.xml><?xml version="1.0" encoding="utf-8"?>
 <p:sld xmlns:a="http://schemas.openxmlformats.org/drawingml/2006/main" xmlns:r="http://schemas.openxmlformats.org/officeDocument/2006/relationships" xmlns:p="http://schemas.openxmlformats.org/presentationml/2006/main">
   <p:cSld>
@@ -5278,10 +6506,1837 @@
           <a:chExt cx="0" cy="0"/>
         </a:xfrm>
       </p:grpSpPr>
+      <p:sp>
+        <p:nvSpPr>
+          <p:cNvPr id="2" name="TextBox 1">
+            <a:extLst>
+              <a:ext uri="{FF2B5EF4-FFF2-40B4-BE49-F238E27FC236}">
+                <a16:creationId xmlns:a16="http://schemas.microsoft.com/office/drawing/2014/main" id="{E4A44A43-1CFA-74E7-C81B-8735849BACF8}"/>
+              </a:ext>
+            </a:extLst>
+          </p:cNvPr>
+          <p:cNvSpPr txBox="1"/>
+          <p:nvPr/>
+        </p:nvSpPr>
+        <p:spPr>
+          <a:xfrm>
+            <a:off x="1283367" y="753979"/>
+            <a:ext cx="10122569" cy="369332"/>
+          </a:xfrm>
+          <a:prstGeom prst="rect">
+            <a:avLst/>
+          </a:prstGeom>
+          <a:noFill/>
+        </p:spPr>
+        <p:txBody>
+          <a:bodyPr wrap="square" rtlCol="0">
+            <a:spAutoFit/>
+          </a:bodyPr>
+          <a:lstStyle/>
+          <a:p>
+            <a:r>
+              <a:rPr lang="en-GB" dirty="0"/>
+              <a:t>The following missing data flowchart was constructed with the </a:t>
+            </a:r>
+            <a:r>
+              <a:rPr lang="en-GB" dirty="0" err="1"/>
+              <a:t>hrep</a:t>
+            </a:r>
+            <a:r>
+              <a:rPr lang="en-GB" dirty="0"/>
+              <a:t> of information gained by </a:t>
+            </a:r>
+          </a:p>
+        </p:txBody>
+      </p:sp>
+      <p:sp>
+        <p:nvSpPr>
+          <p:cNvPr id="4" name="TextBox 3">
+            <a:extLst>
+              <a:ext uri="{FF2B5EF4-FFF2-40B4-BE49-F238E27FC236}">
+                <a16:creationId xmlns:a16="http://schemas.microsoft.com/office/drawing/2014/main" id="{35E88504-6FA0-D810-9FC1-BDCB9C1CF863}"/>
+              </a:ext>
+            </a:extLst>
+          </p:cNvPr>
+          <p:cNvSpPr txBox="1"/>
+          <p:nvPr/>
+        </p:nvSpPr>
+        <p:spPr>
+          <a:xfrm>
+            <a:off x="581891" y="4100945"/>
+            <a:ext cx="2382982" cy="923330"/>
+          </a:xfrm>
+          <a:prstGeom prst="rect">
+            <a:avLst/>
+          </a:prstGeom>
+          <a:noFill/>
+          <a:ln>
+            <a:solidFill>
+              <a:schemeClr val="accent1"/>
+            </a:solidFill>
+          </a:ln>
+        </p:spPr>
+        <p:txBody>
+          <a:bodyPr wrap="square" rtlCol="0">
+            <a:spAutoFit/>
+          </a:bodyPr>
+          <a:lstStyle/>
+          <a:p>
+            <a:r>
+              <a:rPr lang="en-ZA" sz="1800" dirty="0">
+                <a:solidFill>
+                  <a:srgbClr val="0F117C"/>
+                </a:solidFill>
+                <a:effectLst/>
+                <a:latin typeface="AdvOTd0125be5.BI"/>
+              </a:rPr>
+              <a:t>Methods of Handling Missing Data </a:t>
+            </a:r>
+            <a:endParaRPr lang="en-ZA" dirty="0"/>
+          </a:p>
+          <a:p>
+            <a:endParaRPr lang="en-GB" dirty="0"/>
+          </a:p>
+        </p:txBody>
+      </p:sp>
+      <p:sp>
+        <p:nvSpPr>
+          <p:cNvPr id="6" name="TextBox 5">
+            <a:extLst>
+              <a:ext uri="{FF2B5EF4-FFF2-40B4-BE49-F238E27FC236}">
+                <a16:creationId xmlns:a16="http://schemas.microsoft.com/office/drawing/2014/main" id="{627AE9E4-CD27-14B9-5C3D-007FF8A31B9A}"/>
+              </a:ext>
+            </a:extLst>
+          </p:cNvPr>
+          <p:cNvSpPr txBox="1"/>
+          <p:nvPr/>
+        </p:nvSpPr>
+        <p:spPr>
+          <a:xfrm>
+            <a:off x="3282796" y="7903089"/>
+            <a:ext cx="2382982" cy="646331"/>
+          </a:xfrm>
+          <a:prstGeom prst="rect">
+            <a:avLst/>
+          </a:prstGeom>
+          <a:noFill/>
+          <a:ln>
+            <a:solidFill>
+              <a:schemeClr val="accent1"/>
+            </a:solidFill>
+          </a:ln>
+        </p:spPr>
+        <p:txBody>
+          <a:bodyPr wrap="square" rtlCol="0">
+            <a:spAutoFit/>
+          </a:bodyPr>
+          <a:lstStyle/>
+          <a:p>
+            <a:r>
+              <a:rPr lang="en-ZA" sz="1800" dirty="0">
+                <a:effectLst/>
+                <a:latin typeface="AdvOT7d6df7ab.I"/>
+              </a:rPr>
+              <a:t>Imputation of missing values </a:t>
+            </a:r>
+            <a:endParaRPr lang="en-ZA" dirty="0"/>
+          </a:p>
+        </p:txBody>
+      </p:sp>
+      <p:sp>
+        <p:nvSpPr>
+          <p:cNvPr id="7" name="TextBox 6">
+            <a:extLst>
+              <a:ext uri="{FF2B5EF4-FFF2-40B4-BE49-F238E27FC236}">
+                <a16:creationId xmlns:a16="http://schemas.microsoft.com/office/drawing/2014/main" id="{34C27ECB-4F96-3780-94F3-821D2C252E93}"/>
+              </a:ext>
+            </a:extLst>
+          </p:cNvPr>
+          <p:cNvSpPr txBox="1"/>
+          <p:nvPr/>
+        </p:nvSpPr>
+        <p:spPr>
+          <a:xfrm>
+            <a:off x="3961669" y="2869147"/>
+            <a:ext cx="2382982" cy="369332"/>
+          </a:xfrm>
+          <a:prstGeom prst="rect">
+            <a:avLst/>
+          </a:prstGeom>
+          <a:noFill/>
+          <a:ln>
+            <a:solidFill>
+              <a:schemeClr val="accent1"/>
+            </a:solidFill>
+          </a:ln>
+        </p:spPr>
+        <p:txBody>
+          <a:bodyPr wrap="square" rtlCol="0">
+            <a:spAutoFit/>
+          </a:bodyPr>
+          <a:lstStyle/>
+          <a:p>
+            <a:r>
+              <a:rPr lang="en-ZA" sz="1800" dirty="0">
+                <a:effectLst/>
+                <a:latin typeface="AdvOT7d6df7ab.I"/>
+              </a:rPr>
+              <a:t>Ignoring Missing Values </a:t>
+            </a:r>
+            <a:endParaRPr lang="en-ZA" dirty="0"/>
+          </a:p>
+        </p:txBody>
+      </p:sp>
+      <p:sp>
+        <p:nvSpPr>
+          <p:cNvPr id="8" name="TextBox 7">
+            <a:extLst>
+              <a:ext uri="{FF2B5EF4-FFF2-40B4-BE49-F238E27FC236}">
+                <a16:creationId xmlns:a16="http://schemas.microsoft.com/office/drawing/2014/main" id="{ED386443-1849-68C1-EC5D-62A6AAF3A12A}"/>
+              </a:ext>
+            </a:extLst>
+          </p:cNvPr>
+          <p:cNvSpPr txBox="1"/>
+          <p:nvPr/>
+        </p:nvSpPr>
+        <p:spPr>
+          <a:xfrm>
+            <a:off x="6644327" y="3440850"/>
+            <a:ext cx="2382982" cy="369332"/>
+          </a:xfrm>
+          <a:prstGeom prst="rect">
+            <a:avLst/>
+          </a:prstGeom>
+          <a:noFill/>
+          <a:ln>
+            <a:solidFill>
+              <a:schemeClr val="accent1"/>
+            </a:solidFill>
+          </a:ln>
+        </p:spPr>
+        <p:txBody>
+          <a:bodyPr wrap="square" rtlCol="0">
+            <a:spAutoFit/>
+          </a:bodyPr>
+          <a:lstStyle/>
+          <a:p>
+            <a:r>
+              <a:rPr lang="en-ZA" sz="1800" dirty="0">
+                <a:effectLst/>
+                <a:latin typeface="AdvOT1ef757c0"/>
+              </a:rPr>
+              <a:t>pairwise deletion </a:t>
+            </a:r>
+            <a:endParaRPr lang="en-ZA" dirty="0"/>
+          </a:p>
+        </p:txBody>
+      </p:sp>
+      <p:sp>
+        <p:nvSpPr>
+          <p:cNvPr id="9" name="TextBox 8">
+            <a:extLst>
+              <a:ext uri="{FF2B5EF4-FFF2-40B4-BE49-F238E27FC236}">
+                <a16:creationId xmlns:a16="http://schemas.microsoft.com/office/drawing/2014/main" id="{3B3FD9DB-4067-D36A-5F55-A46056D1AB7F}"/>
+              </a:ext>
+            </a:extLst>
+          </p:cNvPr>
+          <p:cNvSpPr txBox="1"/>
+          <p:nvPr/>
+        </p:nvSpPr>
+        <p:spPr>
+          <a:xfrm>
+            <a:off x="6644327" y="2288962"/>
+            <a:ext cx="2382982" cy="369332"/>
+          </a:xfrm>
+          <a:prstGeom prst="rect">
+            <a:avLst/>
+          </a:prstGeom>
+          <a:noFill/>
+          <a:ln>
+            <a:solidFill>
+              <a:schemeClr val="accent1"/>
+            </a:solidFill>
+          </a:ln>
+        </p:spPr>
+        <p:txBody>
+          <a:bodyPr wrap="square" rtlCol="0">
+            <a:spAutoFit/>
+          </a:bodyPr>
+          <a:lstStyle/>
+          <a:p>
+            <a:r>
+              <a:rPr lang="en-ZA" sz="1800" dirty="0">
+                <a:effectLst/>
+                <a:latin typeface="AdvOT1ef757c0"/>
+              </a:rPr>
+              <a:t>listwise deletion </a:t>
+            </a:r>
+            <a:endParaRPr lang="en-ZA" dirty="0"/>
+          </a:p>
+        </p:txBody>
+      </p:sp>
+      <p:sp>
+        <p:nvSpPr>
+          <p:cNvPr id="10" name="TextBox 9">
+            <a:extLst>
+              <a:ext uri="{FF2B5EF4-FFF2-40B4-BE49-F238E27FC236}">
+                <a16:creationId xmlns:a16="http://schemas.microsoft.com/office/drawing/2014/main" id="{303D3692-A3A7-0EFA-C1E7-C96D33D4F735}"/>
+              </a:ext>
+            </a:extLst>
+          </p:cNvPr>
+          <p:cNvSpPr txBox="1"/>
+          <p:nvPr/>
+        </p:nvSpPr>
+        <p:spPr>
+          <a:xfrm>
+            <a:off x="6344651" y="9328034"/>
+            <a:ext cx="2382982" cy="369332"/>
+          </a:xfrm>
+          <a:prstGeom prst="rect">
+            <a:avLst/>
+          </a:prstGeom>
+          <a:noFill/>
+          <a:ln>
+            <a:solidFill>
+              <a:schemeClr val="accent1"/>
+            </a:solidFill>
+          </a:ln>
+        </p:spPr>
+        <p:txBody>
+          <a:bodyPr wrap="square" rtlCol="0">
+            <a:spAutoFit/>
+          </a:bodyPr>
+          <a:lstStyle/>
+          <a:p>
+            <a:r>
+              <a:rPr lang="en-ZA" sz="1800" dirty="0">
+                <a:solidFill>
+                  <a:srgbClr val="0F117C"/>
+                </a:solidFill>
+                <a:effectLst/>
+                <a:latin typeface="AdvOT56309c18.I"/>
+              </a:rPr>
+              <a:t>Multiple Imputation </a:t>
+            </a:r>
+            <a:endParaRPr lang="en-ZA" dirty="0"/>
+          </a:p>
+        </p:txBody>
+      </p:sp>
+      <p:sp>
+        <p:nvSpPr>
+          <p:cNvPr id="11" name="TextBox 10">
+            <a:extLst>
+              <a:ext uri="{FF2B5EF4-FFF2-40B4-BE49-F238E27FC236}">
+                <a16:creationId xmlns:a16="http://schemas.microsoft.com/office/drawing/2014/main" id="{E73A2650-608F-0D91-0A12-01AF5D80D117}"/>
+              </a:ext>
+            </a:extLst>
+          </p:cNvPr>
+          <p:cNvSpPr txBox="1"/>
+          <p:nvPr/>
+        </p:nvSpPr>
+        <p:spPr>
+          <a:xfrm>
+            <a:off x="6344651" y="6989581"/>
+            <a:ext cx="2382982" cy="369332"/>
+          </a:xfrm>
+          <a:prstGeom prst="rect">
+            <a:avLst/>
+          </a:prstGeom>
+          <a:noFill/>
+          <a:ln>
+            <a:solidFill>
+              <a:schemeClr val="accent1"/>
+            </a:solidFill>
+          </a:ln>
+        </p:spPr>
+        <p:txBody>
+          <a:bodyPr wrap="square" rtlCol="0">
+            <a:spAutoFit/>
+          </a:bodyPr>
+          <a:lstStyle/>
+          <a:p>
+            <a:r>
+              <a:rPr lang="en-ZA" sz="1800" dirty="0">
+                <a:solidFill>
+                  <a:srgbClr val="0F117C"/>
+                </a:solidFill>
+                <a:effectLst/>
+                <a:latin typeface="AdvOT56309c18.I"/>
+              </a:rPr>
+              <a:t>Single Imputation </a:t>
+            </a:r>
+            <a:r>
+              <a:rPr lang="en-ZA" sz="1800" dirty="0">
+                <a:effectLst/>
+                <a:latin typeface="AdvOT1ef757c0"/>
+              </a:rPr>
+              <a:t> </a:t>
+            </a:r>
+            <a:endParaRPr lang="en-ZA" dirty="0"/>
+          </a:p>
+        </p:txBody>
+      </p:sp>
+      <p:sp>
+        <p:nvSpPr>
+          <p:cNvPr id="12" name="TextBox 11">
+            <a:extLst>
+              <a:ext uri="{FF2B5EF4-FFF2-40B4-BE49-F238E27FC236}">
+                <a16:creationId xmlns:a16="http://schemas.microsoft.com/office/drawing/2014/main" id="{A3953826-69E5-67AF-C2B6-4EB1FC1D79FC}"/>
+              </a:ext>
+            </a:extLst>
+          </p:cNvPr>
+          <p:cNvSpPr txBox="1"/>
+          <p:nvPr/>
+        </p:nvSpPr>
+        <p:spPr>
+          <a:xfrm>
+            <a:off x="9137415" y="6303023"/>
+            <a:ext cx="2382982" cy="369332"/>
+          </a:xfrm>
+          <a:prstGeom prst="rect">
+            <a:avLst/>
+          </a:prstGeom>
+          <a:noFill/>
+          <a:ln>
+            <a:solidFill>
+              <a:schemeClr val="accent1"/>
+            </a:solidFill>
+          </a:ln>
+        </p:spPr>
+        <p:txBody>
+          <a:bodyPr wrap="square" rtlCol="0">
+            <a:spAutoFit/>
+          </a:bodyPr>
+          <a:lstStyle/>
+          <a:p>
+            <a:r>
+              <a:rPr lang="en-ZA" sz="1800" dirty="0">
+                <a:effectLst/>
+                <a:latin typeface="AdvOT7d6df7ab.I"/>
+              </a:rPr>
+              <a:t>Mean Imputation </a:t>
+            </a:r>
+            <a:endParaRPr lang="en-ZA" dirty="0"/>
+          </a:p>
+        </p:txBody>
+      </p:sp>
+      <p:sp>
+        <p:nvSpPr>
+          <p:cNvPr id="13" name="TextBox 12">
+            <a:extLst>
+              <a:ext uri="{FF2B5EF4-FFF2-40B4-BE49-F238E27FC236}">
+                <a16:creationId xmlns:a16="http://schemas.microsoft.com/office/drawing/2014/main" id="{B00797B3-2472-CBAF-6D4C-A9E98DA589CE}"/>
+              </a:ext>
+            </a:extLst>
+          </p:cNvPr>
+          <p:cNvSpPr txBox="1"/>
+          <p:nvPr/>
+        </p:nvSpPr>
+        <p:spPr>
+          <a:xfrm>
+            <a:off x="9137415" y="5380490"/>
+            <a:ext cx="2382982" cy="646331"/>
+          </a:xfrm>
+          <a:prstGeom prst="rect">
+            <a:avLst/>
+          </a:prstGeom>
+          <a:noFill/>
+          <a:ln>
+            <a:solidFill>
+              <a:schemeClr val="accent1"/>
+            </a:solidFill>
+          </a:ln>
+        </p:spPr>
+        <p:txBody>
+          <a:bodyPr wrap="square" rtlCol="0">
+            <a:spAutoFit/>
+          </a:bodyPr>
+          <a:lstStyle/>
+          <a:p>
+            <a:r>
+              <a:rPr lang="en-ZA" sz="1800" dirty="0">
+                <a:effectLst/>
+                <a:latin typeface="AdvOT7d6df7ab.I"/>
+              </a:rPr>
+              <a:t>Imputation with the constant </a:t>
+            </a:r>
+            <a:endParaRPr lang="en-ZA" dirty="0"/>
+          </a:p>
+        </p:txBody>
+      </p:sp>
+      <p:sp>
+        <p:nvSpPr>
+          <p:cNvPr id="14" name="TextBox 13">
+            <a:extLst>
+              <a:ext uri="{FF2B5EF4-FFF2-40B4-BE49-F238E27FC236}">
+                <a16:creationId xmlns:a16="http://schemas.microsoft.com/office/drawing/2014/main" id="{7586B67A-C65A-C2A2-1188-76E6037032D9}"/>
+              </a:ext>
+            </a:extLst>
+          </p:cNvPr>
+          <p:cNvSpPr txBox="1"/>
+          <p:nvPr/>
+        </p:nvSpPr>
+        <p:spPr>
+          <a:xfrm>
+            <a:off x="9137415" y="6948557"/>
+            <a:ext cx="2382982" cy="646331"/>
+          </a:xfrm>
+          <a:prstGeom prst="rect">
+            <a:avLst/>
+          </a:prstGeom>
+          <a:noFill/>
+          <a:ln>
+            <a:solidFill>
+              <a:schemeClr val="accent1"/>
+            </a:solidFill>
+          </a:ln>
+        </p:spPr>
+        <p:txBody>
+          <a:bodyPr wrap="square" rtlCol="0">
+            <a:spAutoFit/>
+          </a:bodyPr>
+          <a:lstStyle/>
+          <a:p>
+            <a:r>
+              <a:rPr lang="en-ZA" sz="1800" dirty="0">
+                <a:effectLst/>
+                <a:latin typeface="AdvOT7d6df7ab.I"/>
+              </a:rPr>
+              <a:t>Imputation with distributions </a:t>
+            </a:r>
+            <a:endParaRPr lang="en-ZA" dirty="0"/>
+          </a:p>
+        </p:txBody>
+      </p:sp>
+      <p:sp>
+        <p:nvSpPr>
+          <p:cNvPr id="15" name="TextBox 14">
+            <a:extLst>
+              <a:ext uri="{FF2B5EF4-FFF2-40B4-BE49-F238E27FC236}">
+                <a16:creationId xmlns:a16="http://schemas.microsoft.com/office/drawing/2014/main" id="{43696A28-914E-4EF2-A70B-EC69D0A10ACB}"/>
+              </a:ext>
+            </a:extLst>
+          </p:cNvPr>
+          <p:cNvSpPr txBox="1"/>
+          <p:nvPr/>
+        </p:nvSpPr>
+        <p:spPr>
+          <a:xfrm>
+            <a:off x="9137415" y="7802892"/>
+            <a:ext cx="2382982" cy="369332"/>
+          </a:xfrm>
+          <a:prstGeom prst="rect">
+            <a:avLst/>
+          </a:prstGeom>
+          <a:noFill/>
+          <a:ln>
+            <a:solidFill>
+              <a:schemeClr val="accent1"/>
+            </a:solidFill>
+          </a:ln>
+        </p:spPr>
+        <p:txBody>
+          <a:bodyPr wrap="square" rtlCol="0">
+            <a:spAutoFit/>
+          </a:bodyPr>
+          <a:lstStyle/>
+          <a:p>
+            <a:r>
+              <a:rPr lang="en-ZA" sz="1800" dirty="0">
+                <a:effectLst/>
+                <a:latin typeface="AdvOT7d6df7ab.I"/>
+              </a:rPr>
+              <a:t>Regression Imputation </a:t>
+            </a:r>
+            <a:endParaRPr lang="en-ZA" dirty="0"/>
+          </a:p>
+        </p:txBody>
+      </p:sp>
+      <p:sp>
+        <p:nvSpPr>
+          <p:cNvPr id="16" name="TextBox 15">
+            <a:extLst>
+              <a:ext uri="{FF2B5EF4-FFF2-40B4-BE49-F238E27FC236}">
+                <a16:creationId xmlns:a16="http://schemas.microsoft.com/office/drawing/2014/main" id="{8112BC58-C444-0E17-B99C-A07A2215778F}"/>
+              </a:ext>
+            </a:extLst>
+          </p:cNvPr>
+          <p:cNvSpPr txBox="1"/>
+          <p:nvPr/>
+        </p:nvSpPr>
+        <p:spPr>
+          <a:xfrm>
+            <a:off x="9095872" y="8380228"/>
+            <a:ext cx="2382982" cy="369332"/>
+          </a:xfrm>
+          <a:prstGeom prst="rect">
+            <a:avLst/>
+          </a:prstGeom>
+          <a:noFill/>
+          <a:ln>
+            <a:solidFill>
+              <a:schemeClr val="accent1"/>
+            </a:solidFill>
+          </a:ln>
+        </p:spPr>
+        <p:txBody>
+          <a:bodyPr wrap="square" rtlCol="0">
+            <a:spAutoFit/>
+          </a:bodyPr>
+          <a:lstStyle/>
+          <a:p>
+            <a:r>
+              <a:rPr lang="en-ZA" sz="1800" dirty="0" err="1">
+                <a:effectLst/>
+                <a:latin typeface="AdvOT7d6df7ab.I"/>
+              </a:rPr>
+              <a:t>kNN</a:t>
+            </a:r>
+            <a:r>
+              <a:rPr lang="en-ZA" sz="1800" dirty="0">
+                <a:effectLst/>
+                <a:latin typeface="AdvOT7d6df7ab.I"/>
+              </a:rPr>
+              <a:t> Imputation </a:t>
+            </a:r>
+            <a:endParaRPr lang="en-ZA" dirty="0"/>
+          </a:p>
+        </p:txBody>
+      </p:sp>
     </p:spTree>
     <p:extLst>
       <p:ext uri="{BB962C8B-B14F-4D97-AF65-F5344CB8AC3E}">
         <p14:creationId xmlns:p14="http://schemas.microsoft.com/office/powerpoint/2010/main" val="2844281230"/>
+      </p:ext>
+    </p:extLst>
+  </p:cSld>
+  <p:clrMapOvr>
+    <a:masterClrMapping/>
+  </p:clrMapOvr>
+</p:sld>
+</file>
+
+<file path=ppt/slides/slide6.xml><?xml version="1.0" encoding="utf-8"?>
+<p:sld xmlns:a="http://schemas.openxmlformats.org/drawingml/2006/main" xmlns:r="http://schemas.openxmlformats.org/officeDocument/2006/relationships" xmlns:p="http://schemas.openxmlformats.org/presentationml/2006/main">
+  <p:cSld>
+    <p:spTree>
+      <p:nvGrpSpPr>
+        <p:cNvPr id="1" name=""/>
+        <p:cNvGrpSpPr/>
+        <p:nvPr/>
+      </p:nvGrpSpPr>
+      <p:grpSpPr>
+        <a:xfrm>
+          <a:off x="0" y="0"/>
+          <a:ext cx="0" cy="0"/>
+          <a:chOff x="0" y="0"/>
+          <a:chExt cx="0" cy="0"/>
+        </a:xfrm>
+      </p:grpSpPr>
+      <p:sp>
+        <p:nvSpPr>
+          <p:cNvPr id="2" name="TextBox 1">
+            <a:extLst>
+              <a:ext uri="{FF2B5EF4-FFF2-40B4-BE49-F238E27FC236}">
+                <a16:creationId xmlns:a16="http://schemas.microsoft.com/office/drawing/2014/main" id="{E4A44A43-1CFA-74E7-C81B-8735849BACF8}"/>
+              </a:ext>
+            </a:extLst>
+          </p:cNvPr>
+          <p:cNvSpPr txBox="1"/>
+          <p:nvPr/>
+        </p:nvSpPr>
+        <p:spPr>
+          <a:xfrm>
+            <a:off x="1283367" y="753979"/>
+            <a:ext cx="10122569" cy="369332"/>
+          </a:xfrm>
+          <a:prstGeom prst="rect">
+            <a:avLst/>
+          </a:prstGeom>
+          <a:noFill/>
+        </p:spPr>
+        <p:txBody>
+          <a:bodyPr wrap="square" rtlCol="0">
+            <a:spAutoFit/>
+          </a:bodyPr>
+          <a:lstStyle/>
+          <a:p>
+            <a:r>
+              <a:rPr lang="en-GB" dirty="0"/>
+              <a:t>The following missing data flowchart was constructed with the </a:t>
+            </a:r>
+            <a:r>
+              <a:rPr lang="en-GB" dirty="0" err="1"/>
+              <a:t>hrep</a:t>
+            </a:r>
+            <a:r>
+              <a:rPr lang="en-GB" dirty="0"/>
+              <a:t> of information gained by </a:t>
+            </a:r>
+          </a:p>
+        </p:txBody>
+      </p:sp>
+      <p:sp>
+        <p:nvSpPr>
+          <p:cNvPr id="4" name="TextBox 3">
+            <a:extLst>
+              <a:ext uri="{FF2B5EF4-FFF2-40B4-BE49-F238E27FC236}">
+                <a16:creationId xmlns:a16="http://schemas.microsoft.com/office/drawing/2014/main" id="{35E88504-6FA0-D810-9FC1-BDCB9C1CF863}"/>
+              </a:ext>
+            </a:extLst>
+          </p:cNvPr>
+          <p:cNvSpPr txBox="1"/>
+          <p:nvPr/>
+        </p:nvSpPr>
+        <p:spPr>
+          <a:xfrm>
+            <a:off x="0" y="5419618"/>
+            <a:ext cx="2382982" cy="646331"/>
+          </a:xfrm>
+          <a:prstGeom prst="rect">
+            <a:avLst/>
+          </a:prstGeom>
+          <a:noFill/>
+          <a:ln>
+            <a:solidFill>
+              <a:schemeClr val="accent1"/>
+            </a:solidFill>
+          </a:ln>
+        </p:spPr>
+        <p:txBody>
+          <a:bodyPr wrap="square" rtlCol="0">
+            <a:spAutoFit/>
+          </a:bodyPr>
+          <a:lstStyle/>
+          <a:p>
+            <a:r>
+              <a:rPr lang="en-GB" dirty="0"/>
+              <a:t>Dataset with missing values</a:t>
+            </a:r>
+          </a:p>
+        </p:txBody>
+      </p:sp>
+      <p:sp>
+        <p:nvSpPr>
+          <p:cNvPr id="6" name="TextBox 5">
+            <a:extLst>
+              <a:ext uri="{FF2B5EF4-FFF2-40B4-BE49-F238E27FC236}">
+                <a16:creationId xmlns:a16="http://schemas.microsoft.com/office/drawing/2014/main" id="{627AE9E4-CD27-14B9-5C3D-007FF8A31B9A}"/>
+              </a:ext>
+            </a:extLst>
+          </p:cNvPr>
+          <p:cNvSpPr txBox="1"/>
+          <p:nvPr/>
+        </p:nvSpPr>
+        <p:spPr>
+          <a:xfrm>
+            <a:off x="2634133" y="7810971"/>
+            <a:ext cx="2382982" cy="369332"/>
+          </a:xfrm>
+          <a:prstGeom prst="rect">
+            <a:avLst/>
+          </a:prstGeom>
+          <a:noFill/>
+          <a:ln>
+            <a:solidFill>
+              <a:schemeClr val="accent1"/>
+            </a:solidFill>
+          </a:ln>
+        </p:spPr>
+        <p:txBody>
+          <a:bodyPr wrap="square" rtlCol="0">
+            <a:spAutoFit/>
+          </a:bodyPr>
+          <a:lstStyle/>
+          <a:p>
+            <a:r>
+              <a:rPr lang="en-ZA" sz="1800" dirty="0">
+                <a:effectLst/>
+                <a:latin typeface="AdvOT7d6df7ab.I"/>
+              </a:rPr>
+              <a:t>Numeric Features</a:t>
+            </a:r>
+            <a:endParaRPr lang="en-ZA" dirty="0"/>
+          </a:p>
+        </p:txBody>
+      </p:sp>
+      <p:sp>
+        <p:nvSpPr>
+          <p:cNvPr id="7" name="TextBox 6">
+            <a:extLst>
+              <a:ext uri="{FF2B5EF4-FFF2-40B4-BE49-F238E27FC236}">
+                <a16:creationId xmlns:a16="http://schemas.microsoft.com/office/drawing/2014/main" id="{34C27ECB-4F96-3780-94F3-821D2C252E93}"/>
+              </a:ext>
+            </a:extLst>
+          </p:cNvPr>
+          <p:cNvSpPr txBox="1"/>
+          <p:nvPr/>
+        </p:nvSpPr>
+        <p:spPr>
+          <a:xfrm>
+            <a:off x="2860909" y="3786885"/>
+            <a:ext cx="2382982" cy="369332"/>
+          </a:xfrm>
+          <a:prstGeom prst="rect">
+            <a:avLst/>
+          </a:prstGeom>
+          <a:noFill/>
+          <a:ln>
+            <a:solidFill>
+              <a:schemeClr val="accent1"/>
+            </a:solidFill>
+          </a:ln>
+        </p:spPr>
+        <p:txBody>
+          <a:bodyPr wrap="square" rtlCol="0">
+            <a:spAutoFit/>
+          </a:bodyPr>
+          <a:lstStyle/>
+          <a:p>
+            <a:r>
+              <a:rPr lang="en-ZA" sz="1800" dirty="0">
+                <a:effectLst/>
+                <a:latin typeface="AdvOT7d6df7ab.I"/>
+              </a:rPr>
+              <a:t>Categorical features</a:t>
+            </a:r>
+            <a:endParaRPr lang="en-ZA" dirty="0"/>
+          </a:p>
+        </p:txBody>
+      </p:sp>
+      <p:sp>
+        <p:nvSpPr>
+          <p:cNvPr id="3" name="TextBox 2">
+            <a:extLst>
+              <a:ext uri="{FF2B5EF4-FFF2-40B4-BE49-F238E27FC236}">
+                <a16:creationId xmlns:a16="http://schemas.microsoft.com/office/drawing/2014/main" id="{1DF47BD0-9F3E-9093-73EC-617767D29B0A}"/>
+              </a:ext>
+            </a:extLst>
+          </p:cNvPr>
+          <p:cNvSpPr txBox="1"/>
+          <p:nvPr/>
+        </p:nvSpPr>
+        <p:spPr>
+          <a:xfrm>
+            <a:off x="6040145" y="3625516"/>
+            <a:ext cx="2382982" cy="646331"/>
+          </a:xfrm>
+          <a:prstGeom prst="rect">
+            <a:avLst/>
+          </a:prstGeom>
+          <a:noFill/>
+          <a:ln>
+            <a:solidFill>
+              <a:schemeClr val="accent1"/>
+            </a:solidFill>
+          </a:ln>
+        </p:spPr>
+        <p:txBody>
+          <a:bodyPr wrap="square" rtlCol="0">
+            <a:spAutoFit/>
+          </a:bodyPr>
+          <a:lstStyle/>
+          <a:p>
+            <a:r>
+              <a:rPr lang="en-ZA" dirty="0">
+                <a:latin typeface="AdvOT7d6df7ab.I"/>
+              </a:rPr>
+              <a:t>Degree of missing values</a:t>
+            </a:r>
+            <a:endParaRPr lang="en-ZA" dirty="0"/>
+          </a:p>
+        </p:txBody>
+      </p:sp>
+      <p:sp>
+        <p:nvSpPr>
+          <p:cNvPr id="5" name="TextBox 4">
+            <a:extLst>
+              <a:ext uri="{FF2B5EF4-FFF2-40B4-BE49-F238E27FC236}">
+                <a16:creationId xmlns:a16="http://schemas.microsoft.com/office/drawing/2014/main" id="{AE265BC5-5A8F-6CBD-55D3-68FAC2E59BDE}"/>
+              </a:ext>
+            </a:extLst>
+          </p:cNvPr>
+          <p:cNvSpPr txBox="1"/>
+          <p:nvPr/>
+        </p:nvSpPr>
+        <p:spPr>
+          <a:xfrm>
+            <a:off x="9231477" y="4867633"/>
+            <a:ext cx="2382982" cy="646331"/>
+          </a:xfrm>
+          <a:prstGeom prst="rect">
+            <a:avLst/>
+          </a:prstGeom>
+          <a:noFill/>
+          <a:ln>
+            <a:solidFill>
+              <a:schemeClr val="accent1"/>
+            </a:solidFill>
+          </a:ln>
+        </p:spPr>
+        <p:txBody>
+          <a:bodyPr wrap="square" rtlCol="0">
+            <a:spAutoFit/>
+          </a:bodyPr>
+          <a:lstStyle/>
+          <a:p>
+            <a:r>
+              <a:rPr lang="en-ZA" dirty="0">
+                <a:latin typeface="AdvOT7d6df7ab.I"/>
+              </a:rPr>
+              <a:t>Degree of missing values</a:t>
+            </a:r>
+            <a:endParaRPr lang="en-ZA" dirty="0"/>
+          </a:p>
+        </p:txBody>
+      </p:sp>
+      <p:sp>
+        <p:nvSpPr>
+          <p:cNvPr id="17" name="TextBox 16">
+            <a:extLst>
+              <a:ext uri="{FF2B5EF4-FFF2-40B4-BE49-F238E27FC236}">
+                <a16:creationId xmlns:a16="http://schemas.microsoft.com/office/drawing/2014/main" id="{82C5A91F-F48F-CD79-A0C3-31434921A5C6}"/>
+              </a:ext>
+            </a:extLst>
+          </p:cNvPr>
+          <p:cNvSpPr txBox="1"/>
+          <p:nvPr/>
+        </p:nvSpPr>
+        <p:spPr>
+          <a:xfrm>
+            <a:off x="9231477" y="3758420"/>
+            <a:ext cx="2382982" cy="369332"/>
+          </a:xfrm>
+          <a:prstGeom prst="rect">
+            <a:avLst/>
+          </a:prstGeom>
+          <a:noFill/>
+          <a:ln>
+            <a:solidFill>
+              <a:schemeClr val="accent1"/>
+            </a:solidFill>
+          </a:ln>
+        </p:spPr>
+        <p:txBody>
+          <a:bodyPr wrap="square" rtlCol="0">
+            <a:spAutoFit/>
+          </a:bodyPr>
+          <a:lstStyle/>
+          <a:p>
+            <a:r>
+              <a:rPr lang="en-ZA" dirty="0">
+                <a:latin typeface="AdvOT7d6df7ab.I"/>
+              </a:rPr>
+              <a:t>Medium</a:t>
+            </a:r>
+            <a:endParaRPr lang="en-ZA" dirty="0"/>
+          </a:p>
+        </p:txBody>
+      </p:sp>
+      <p:sp>
+        <p:nvSpPr>
+          <p:cNvPr id="18" name="TextBox 17">
+            <a:extLst>
+              <a:ext uri="{FF2B5EF4-FFF2-40B4-BE49-F238E27FC236}">
+                <a16:creationId xmlns:a16="http://schemas.microsoft.com/office/drawing/2014/main" id="{6F33B2DE-CDA5-C0B0-2095-817CF37732F2}"/>
+              </a:ext>
+            </a:extLst>
+          </p:cNvPr>
+          <p:cNvSpPr txBox="1"/>
+          <p:nvPr/>
+        </p:nvSpPr>
+        <p:spPr>
+          <a:xfrm>
+            <a:off x="9231477" y="2613552"/>
+            <a:ext cx="2382982" cy="369332"/>
+          </a:xfrm>
+          <a:prstGeom prst="rect">
+            <a:avLst/>
+          </a:prstGeom>
+          <a:noFill/>
+          <a:ln>
+            <a:solidFill>
+              <a:schemeClr val="accent1"/>
+            </a:solidFill>
+          </a:ln>
+        </p:spPr>
+        <p:txBody>
+          <a:bodyPr wrap="square" rtlCol="0">
+            <a:spAutoFit/>
+          </a:bodyPr>
+          <a:lstStyle/>
+          <a:p>
+            <a:r>
+              <a:rPr lang="en-ZA" dirty="0">
+                <a:latin typeface="AdvOT7d6df7ab.I"/>
+              </a:rPr>
+              <a:t>Low </a:t>
+            </a:r>
+            <a:endParaRPr lang="en-ZA" dirty="0"/>
+          </a:p>
+        </p:txBody>
+      </p:sp>
+      <p:sp>
+        <p:nvSpPr>
+          <p:cNvPr id="19" name="TextBox 18">
+            <a:extLst>
+              <a:ext uri="{FF2B5EF4-FFF2-40B4-BE49-F238E27FC236}">
+                <a16:creationId xmlns:a16="http://schemas.microsoft.com/office/drawing/2014/main" id="{BC2CE522-464F-CC89-DED1-D632CDE85166}"/>
+              </a:ext>
+            </a:extLst>
+          </p:cNvPr>
+          <p:cNvSpPr txBox="1"/>
+          <p:nvPr/>
+        </p:nvSpPr>
+        <p:spPr>
+          <a:xfrm>
+            <a:off x="12360541" y="2613552"/>
+            <a:ext cx="2382982" cy="369332"/>
+          </a:xfrm>
+          <a:prstGeom prst="rect">
+            <a:avLst/>
+          </a:prstGeom>
+          <a:noFill/>
+          <a:ln>
+            <a:solidFill>
+              <a:schemeClr val="accent1"/>
+            </a:solidFill>
+          </a:ln>
+        </p:spPr>
+        <p:txBody>
+          <a:bodyPr wrap="square" rtlCol="0">
+            <a:spAutoFit/>
+          </a:bodyPr>
+          <a:lstStyle/>
+          <a:p>
+            <a:r>
+              <a:rPr lang="en-ZA" dirty="0">
+                <a:latin typeface="AdvOT7d6df7ab.I"/>
+              </a:rPr>
+              <a:t>Deletion of instance</a:t>
+            </a:r>
+            <a:endParaRPr lang="en-ZA" dirty="0"/>
+          </a:p>
+        </p:txBody>
+      </p:sp>
+      <p:sp>
+        <p:nvSpPr>
+          <p:cNvPr id="20" name="TextBox 19">
+            <a:extLst>
+              <a:ext uri="{FF2B5EF4-FFF2-40B4-BE49-F238E27FC236}">
+                <a16:creationId xmlns:a16="http://schemas.microsoft.com/office/drawing/2014/main" id="{21BCD34A-431C-4641-5597-1F864B2F7495}"/>
+              </a:ext>
+            </a:extLst>
+          </p:cNvPr>
+          <p:cNvSpPr txBox="1"/>
+          <p:nvPr/>
+        </p:nvSpPr>
+        <p:spPr>
+          <a:xfrm>
+            <a:off x="12416761" y="3789398"/>
+            <a:ext cx="2382982" cy="369332"/>
+          </a:xfrm>
+          <a:prstGeom prst="rect">
+            <a:avLst/>
+          </a:prstGeom>
+          <a:noFill/>
+          <a:ln>
+            <a:solidFill>
+              <a:schemeClr val="accent1"/>
+            </a:solidFill>
+          </a:ln>
+        </p:spPr>
+        <p:txBody>
+          <a:bodyPr wrap="square" rtlCol="0">
+            <a:spAutoFit/>
+          </a:bodyPr>
+          <a:lstStyle/>
+          <a:p>
+            <a:r>
+              <a:rPr lang="en-ZA" dirty="0">
+                <a:latin typeface="AdvOT7d6df7ab.I"/>
+              </a:rPr>
+              <a:t>Imputation</a:t>
+            </a:r>
+            <a:endParaRPr lang="en-ZA" dirty="0"/>
+          </a:p>
+        </p:txBody>
+      </p:sp>
+      <p:sp>
+        <p:nvSpPr>
+          <p:cNvPr id="21" name="TextBox 20">
+            <a:extLst>
+              <a:ext uri="{FF2B5EF4-FFF2-40B4-BE49-F238E27FC236}">
+                <a16:creationId xmlns:a16="http://schemas.microsoft.com/office/drawing/2014/main" id="{6F663AC8-2CCA-5E55-014B-CCE8E66DF56A}"/>
+              </a:ext>
+            </a:extLst>
+          </p:cNvPr>
+          <p:cNvSpPr txBox="1"/>
+          <p:nvPr/>
+        </p:nvSpPr>
+        <p:spPr>
+          <a:xfrm>
+            <a:off x="12416761" y="5050286"/>
+            <a:ext cx="2382982" cy="369332"/>
+          </a:xfrm>
+          <a:prstGeom prst="rect">
+            <a:avLst/>
+          </a:prstGeom>
+          <a:noFill/>
+          <a:ln>
+            <a:solidFill>
+              <a:schemeClr val="accent1"/>
+            </a:solidFill>
+          </a:ln>
+        </p:spPr>
+        <p:txBody>
+          <a:bodyPr wrap="square" rtlCol="0">
+            <a:spAutoFit/>
+          </a:bodyPr>
+          <a:lstStyle/>
+          <a:p>
+            <a:r>
+              <a:rPr lang="en-ZA" dirty="0">
+                <a:latin typeface="AdvOT7d6df7ab.I"/>
+              </a:rPr>
+              <a:t>Feature deletion</a:t>
+            </a:r>
+            <a:endParaRPr lang="en-ZA" dirty="0"/>
+          </a:p>
+        </p:txBody>
+      </p:sp>
+      <p:sp>
+        <p:nvSpPr>
+          <p:cNvPr id="22" name="TextBox 21">
+            <a:extLst>
+              <a:ext uri="{FF2B5EF4-FFF2-40B4-BE49-F238E27FC236}">
+                <a16:creationId xmlns:a16="http://schemas.microsoft.com/office/drawing/2014/main" id="{2A94912D-BF32-3196-8455-1AD406954B8E}"/>
+              </a:ext>
+            </a:extLst>
+          </p:cNvPr>
+          <p:cNvSpPr txBox="1"/>
+          <p:nvPr/>
+        </p:nvSpPr>
+        <p:spPr>
+          <a:xfrm>
+            <a:off x="15602045" y="3758420"/>
+            <a:ext cx="2382982" cy="369332"/>
+          </a:xfrm>
+          <a:prstGeom prst="rect">
+            <a:avLst/>
+          </a:prstGeom>
+          <a:noFill/>
+          <a:ln>
+            <a:solidFill>
+              <a:schemeClr val="accent1"/>
+            </a:solidFill>
+          </a:ln>
+        </p:spPr>
+        <p:txBody>
+          <a:bodyPr wrap="square" rtlCol="0">
+            <a:spAutoFit/>
+          </a:bodyPr>
+          <a:lstStyle/>
+          <a:p>
+            <a:r>
+              <a:rPr lang="en-ZA" dirty="0">
+                <a:latin typeface="AdvOT7d6df7ab.I"/>
+              </a:rPr>
+              <a:t>Model choice</a:t>
+            </a:r>
+            <a:endParaRPr lang="en-ZA" dirty="0"/>
+          </a:p>
+        </p:txBody>
+      </p:sp>
+      <p:sp>
+        <p:nvSpPr>
+          <p:cNvPr id="23" name="TextBox 22">
+            <a:extLst>
+              <a:ext uri="{FF2B5EF4-FFF2-40B4-BE49-F238E27FC236}">
+                <a16:creationId xmlns:a16="http://schemas.microsoft.com/office/drawing/2014/main" id="{688F7A3B-7DCD-5EA3-5ED6-0F40805EB781}"/>
+              </a:ext>
+            </a:extLst>
+          </p:cNvPr>
+          <p:cNvSpPr txBox="1"/>
+          <p:nvPr/>
+        </p:nvSpPr>
+        <p:spPr>
+          <a:xfrm>
+            <a:off x="19062648" y="4271847"/>
+            <a:ext cx="920644" cy="369332"/>
+          </a:xfrm>
+          <a:prstGeom prst="rect">
+            <a:avLst/>
+          </a:prstGeom>
+          <a:noFill/>
+          <a:ln>
+            <a:solidFill>
+              <a:schemeClr val="accent1"/>
+            </a:solidFill>
+          </a:ln>
+        </p:spPr>
+        <p:txBody>
+          <a:bodyPr wrap="square" rtlCol="0">
+            <a:spAutoFit/>
+          </a:bodyPr>
+          <a:lstStyle/>
+          <a:p>
+            <a:r>
+              <a:rPr lang="en-ZA" dirty="0">
+                <a:latin typeface="AdvOT7d6df7ab.I"/>
+              </a:rPr>
+              <a:t>K-NN</a:t>
+            </a:r>
+            <a:endParaRPr lang="en-ZA" dirty="0"/>
+          </a:p>
+        </p:txBody>
+      </p:sp>
+      <p:sp>
+        <p:nvSpPr>
+          <p:cNvPr id="24" name="TextBox 23">
+            <a:extLst>
+              <a:ext uri="{FF2B5EF4-FFF2-40B4-BE49-F238E27FC236}">
+                <a16:creationId xmlns:a16="http://schemas.microsoft.com/office/drawing/2014/main" id="{B966908D-8427-8CFA-10C1-FAFD87CC14F7}"/>
+              </a:ext>
+            </a:extLst>
+          </p:cNvPr>
+          <p:cNvSpPr txBox="1"/>
+          <p:nvPr/>
+        </p:nvSpPr>
+        <p:spPr>
+          <a:xfrm>
+            <a:off x="18788309" y="3046591"/>
+            <a:ext cx="1469322" cy="369332"/>
+          </a:xfrm>
+          <a:prstGeom prst="rect">
+            <a:avLst/>
+          </a:prstGeom>
+          <a:noFill/>
+          <a:ln>
+            <a:solidFill>
+              <a:schemeClr val="accent1"/>
+            </a:solidFill>
+          </a:ln>
+        </p:spPr>
+        <p:txBody>
+          <a:bodyPr wrap="square" rtlCol="0">
+            <a:spAutoFit/>
+          </a:bodyPr>
+          <a:lstStyle/>
+          <a:p>
+            <a:r>
+              <a:rPr lang="en-ZA" dirty="0">
+                <a:latin typeface="AdvOT7d6df7ab.I"/>
+              </a:rPr>
+              <a:t>Decision Tree</a:t>
+            </a:r>
+            <a:endParaRPr lang="en-ZA" dirty="0"/>
+          </a:p>
+        </p:txBody>
+      </p:sp>
+      <p:sp>
+        <p:nvSpPr>
+          <p:cNvPr id="26" name="TextBox 25">
+            <a:extLst>
+              <a:ext uri="{FF2B5EF4-FFF2-40B4-BE49-F238E27FC236}">
+                <a16:creationId xmlns:a16="http://schemas.microsoft.com/office/drawing/2014/main" id="{1B53EBF3-75A2-993B-AE2F-56ACE96E50DC}"/>
+              </a:ext>
+            </a:extLst>
+          </p:cNvPr>
+          <p:cNvSpPr txBox="1"/>
+          <p:nvPr/>
+        </p:nvSpPr>
+        <p:spPr>
+          <a:xfrm>
+            <a:off x="21182712" y="2908091"/>
+            <a:ext cx="1469322" cy="646331"/>
+          </a:xfrm>
+          <a:prstGeom prst="rect">
+            <a:avLst/>
+          </a:prstGeom>
+          <a:noFill/>
+          <a:ln>
+            <a:solidFill>
+              <a:schemeClr val="accent1"/>
+            </a:solidFill>
+          </a:ln>
+        </p:spPr>
+        <p:txBody>
+          <a:bodyPr wrap="square" rtlCol="0">
+            <a:spAutoFit/>
+          </a:bodyPr>
+          <a:lstStyle/>
+          <a:p>
+            <a:r>
+              <a:rPr lang="en-ZA" dirty="0">
+                <a:latin typeface="AdvOT7d6df7ab.I"/>
+              </a:rPr>
+              <a:t>Mode/Naïve Bayes</a:t>
+            </a:r>
+            <a:endParaRPr lang="en-ZA" dirty="0"/>
+          </a:p>
+        </p:txBody>
+      </p:sp>
+      <p:sp>
+        <p:nvSpPr>
+          <p:cNvPr id="28" name="TextBox 27">
+            <a:extLst>
+              <a:ext uri="{FF2B5EF4-FFF2-40B4-BE49-F238E27FC236}">
+                <a16:creationId xmlns:a16="http://schemas.microsoft.com/office/drawing/2014/main" id="{78A2AE0B-B333-D3D6-91B4-AA8F8E945E55}"/>
+              </a:ext>
+            </a:extLst>
+          </p:cNvPr>
+          <p:cNvSpPr txBox="1"/>
+          <p:nvPr/>
+        </p:nvSpPr>
+        <p:spPr>
+          <a:xfrm>
+            <a:off x="21237952" y="4271847"/>
+            <a:ext cx="1469322" cy="369332"/>
+          </a:xfrm>
+          <a:prstGeom prst="rect">
+            <a:avLst/>
+          </a:prstGeom>
+          <a:noFill/>
+          <a:ln>
+            <a:solidFill>
+              <a:schemeClr val="accent1"/>
+            </a:solidFill>
+          </a:ln>
+        </p:spPr>
+        <p:txBody>
+          <a:bodyPr wrap="square" rtlCol="0">
+            <a:spAutoFit/>
+          </a:bodyPr>
+          <a:lstStyle/>
+          <a:p>
+            <a:r>
+              <a:rPr lang="en-ZA" dirty="0">
+                <a:latin typeface="AdvOT7d6df7ab.I"/>
+              </a:rPr>
+              <a:t>Mode</a:t>
+            </a:r>
+            <a:endParaRPr lang="en-ZA" dirty="0"/>
+          </a:p>
+        </p:txBody>
+      </p:sp>
+      <p:sp>
+        <p:nvSpPr>
+          <p:cNvPr id="29" name="TextBox 28">
+            <a:extLst>
+              <a:ext uri="{FF2B5EF4-FFF2-40B4-BE49-F238E27FC236}">
+                <a16:creationId xmlns:a16="http://schemas.microsoft.com/office/drawing/2014/main" id="{D22F7A4B-9EAC-ADAB-F3F9-77BFD0AE09D7}"/>
+              </a:ext>
+            </a:extLst>
+          </p:cNvPr>
+          <p:cNvSpPr txBox="1"/>
+          <p:nvPr/>
+        </p:nvSpPr>
+        <p:spPr>
+          <a:xfrm>
+            <a:off x="6055781" y="7647089"/>
+            <a:ext cx="2382982" cy="646331"/>
+          </a:xfrm>
+          <a:prstGeom prst="rect">
+            <a:avLst/>
+          </a:prstGeom>
+          <a:noFill/>
+          <a:ln>
+            <a:solidFill>
+              <a:schemeClr val="accent1"/>
+            </a:solidFill>
+          </a:ln>
+        </p:spPr>
+        <p:txBody>
+          <a:bodyPr wrap="square" rtlCol="0">
+            <a:spAutoFit/>
+          </a:bodyPr>
+          <a:lstStyle/>
+          <a:p>
+            <a:r>
+              <a:rPr lang="en-ZA" dirty="0">
+                <a:latin typeface="AdvOT7d6df7ab.I"/>
+              </a:rPr>
+              <a:t>Degree of missing values</a:t>
+            </a:r>
+            <a:endParaRPr lang="en-ZA" dirty="0"/>
+          </a:p>
+        </p:txBody>
+      </p:sp>
+      <p:sp>
+        <p:nvSpPr>
+          <p:cNvPr id="30" name="TextBox 29">
+            <a:extLst>
+              <a:ext uri="{FF2B5EF4-FFF2-40B4-BE49-F238E27FC236}">
+                <a16:creationId xmlns:a16="http://schemas.microsoft.com/office/drawing/2014/main" id="{C5849517-F48E-1BE4-FC0E-52209ACC1E56}"/>
+              </a:ext>
+            </a:extLst>
+          </p:cNvPr>
+          <p:cNvSpPr txBox="1"/>
+          <p:nvPr/>
+        </p:nvSpPr>
+        <p:spPr>
+          <a:xfrm>
+            <a:off x="9247113" y="8889206"/>
+            <a:ext cx="2382982" cy="646331"/>
+          </a:xfrm>
+          <a:prstGeom prst="rect">
+            <a:avLst/>
+          </a:prstGeom>
+          <a:noFill/>
+          <a:ln>
+            <a:solidFill>
+              <a:schemeClr val="accent1"/>
+            </a:solidFill>
+          </a:ln>
+        </p:spPr>
+        <p:txBody>
+          <a:bodyPr wrap="square" rtlCol="0">
+            <a:spAutoFit/>
+          </a:bodyPr>
+          <a:lstStyle/>
+          <a:p>
+            <a:r>
+              <a:rPr lang="en-ZA" dirty="0">
+                <a:latin typeface="AdvOT7d6df7ab.I"/>
+              </a:rPr>
+              <a:t>Degree of missing values</a:t>
+            </a:r>
+            <a:endParaRPr lang="en-ZA" dirty="0"/>
+          </a:p>
+        </p:txBody>
+      </p:sp>
+      <p:sp>
+        <p:nvSpPr>
+          <p:cNvPr id="31" name="TextBox 30">
+            <a:extLst>
+              <a:ext uri="{FF2B5EF4-FFF2-40B4-BE49-F238E27FC236}">
+                <a16:creationId xmlns:a16="http://schemas.microsoft.com/office/drawing/2014/main" id="{E9677DFC-E9ED-C776-6F25-46F0A37139EE}"/>
+              </a:ext>
+            </a:extLst>
+          </p:cNvPr>
+          <p:cNvSpPr txBox="1"/>
+          <p:nvPr/>
+        </p:nvSpPr>
+        <p:spPr>
+          <a:xfrm>
+            <a:off x="9247113" y="7779993"/>
+            <a:ext cx="2382982" cy="369332"/>
+          </a:xfrm>
+          <a:prstGeom prst="rect">
+            <a:avLst/>
+          </a:prstGeom>
+          <a:noFill/>
+          <a:ln>
+            <a:solidFill>
+              <a:schemeClr val="accent1"/>
+            </a:solidFill>
+          </a:ln>
+        </p:spPr>
+        <p:txBody>
+          <a:bodyPr wrap="square" rtlCol="0">
+            <a:spAutoFit/>
+          </a:bodyPr>
+          <a:lstStyle/>
+          <a:p>
+            <a:r>
+              <a:rPr lang="en-ZA" dirty="0">
+                <a:latin typeface="AdvOT7d6df7ab.I"/>
+              </a:rPr>
+              <a:t>Medium</a:t>
+            </a:r>
+            <a:endParaRPr lang="en-ZA" dirty="0"/>
+          </a:p>
+        </p:txBody>
+      </p:sp>
+      <p:sp>
+        <p:nvSpPr>
+          <p:cNvPr id="32" name="TextBox 31">
+            <a:extLst>
+              <a:ext uri="{FF2B5EF4-FFF2-40B4-BE49-F238E27FC236}">
+                <a16:creationId xmlns:a16="http://schemas.microsoft.com/office/drawing/2014/main" id="{F920F300-9497-62F0-B8B0-6A36F1D557A1}"/>
+              </a:ext>
+            </a:extLst>
+          </p:cNvPr>
+          <p:cNvSpPr txBox="1"/>
+          <p:nvPr/>
+        </p:nvSpPr>
+        <p:spPr>
+          <a:xfrm>
+            <a:off x="9247113" y="6635125"/>
+            <a:ext cx="2382982" cy="369332"/>
+          </a:xfrm>
+          <a:prstGeom prst="rect">
+            <a:avLst/>
+          </a:prstGeom>
+          <a:noFill/>
+          <a:ln>
+            <a:solidFill>
+              <a:schemeClr val="accent1"/>
+            </a:solidFill>
+          </a:ln>
+        </p:spPr>
+        <p:txBody>
+          <a:bodyPr wrap="square" rtlCol="0">
+            <a:spAutoFit/>
+          </a:bodyPr>
+          <a:lstStyle/>
+          <a:p>
+            <a:r>
+              <a:rPr lang="en-ZA" dirty="0">
+                <a:latin typeface="AdvOT7d6df7ab.I"/>
+              </a:rPr>
+              <a:t>Low </a:t>
+            </a:r>
+            <a:endParaRPr lang="en-ZA" dirty="0"/>
+          </a:p>
+        </p:txBody>
+      </p:sp>
+      <p:sp>
+        <p:nvSpPr>
+          <p:cNvPr id="33" name="TextBox 32">
+            <a:extLst>
+              <a:ext uri="{FF2B5EF4-FFF2-40B4-BE49-F238E27FC236}">
+                <a16:creationId xmlns:a16="http://schemas.microsoft.com/office/drawing/2014/main" id="{12A7C5EE-241F-86F5-5DF7-89020A7FBA35}"/>
+              </a:ext>
+            </a:extLst>
+          </p:cNvPr>
+          <p:cNvSpPr txBox="1"/>
+          <p:nvPr/>
+        </p:nvSpPr>
+        <p:spPr>
+          <a:xfrm>
+            <a:off x="12376177" y="6635125"/>
+            <a:ext cx="2382982" cy="369332"/>
+          </a:xfrm>
+          <a:prstGeom prst="rect">
+            <a:avLst/>
+          </a:prstGeom>
+          <a:noFill/>
+          <a:ln>
+            <a:solidFill>
+              <a:schemeClr val="accent1"/>
+            </a:solidFill>
+          </a:ln>
+        </p:spPr>
+        <p:txBody>
+          <a:bodyPr wrap="square" rtlCol="0">
+            <a:spAutoFit/>
+          </a:bodyPr>
+          <a:lstStyle/>
+          <a:p>
+            <a:r>
+              <a:rPr lang="en-ZA" dirty="0">
+                <a:latin typeface="AdvOT7d6df7ab.I"/>
+              </a:rPr>
+              <a:t>Deletion of instance</a:t>
+            </a:r>
+            <a:endParaRPr lang="en-ZA" dirty="0"/>
+          </a:p>
+        </p:txBody>
+      </p:sp>
+      <p:sp>
+        <p:nvSpPr>
+          <p:cNvPr id="34" name="TextBox 33">
+            <a:extLst>
+              <a:ext uri="{FF2B5EF4-FFF2-40B4-BE49-F238E27FC236}">
+                <a16:creationId xmlns:a16="http://schemas.microsoft.com/office/drawing/2014/main" id="{CD641036-F2EC-230D-E2B6-B440A7B0D6D1}"/>
+              </a:ext>
+            </a:extLst>
+          </p:cNvPr>
+          <p:cNvSpPr txBox="1"/>
+          <p:nvPr/>
+        </p:nvSpPr>
+        <p:spPr>
+          <a:xfrm>
+            <a:off x="12432397" y="7810971"/>
+            <a:ext cx="2382982" cy="369332"/>
+          </a:xfrm>
+          <a:prstGeom prst="rect">
+            <a:avLst/>
+          </a:prstGeom>
+          <a:noFill/>
+          <a:ln>
+            <a:solidFill>
+              <a:schemeClr val="accent1"/>
+            </a:solidFill>
+          </a:ln>
+        </p:spPr>
+        <p:txBody>
+          <a:bodyPr wrap="square" rtlCol="0">
+            <a:spAutoFit/>
+          </a:bodyPr>
+          <a:lstStyle/>
+          <a:p>
+            <a:r>
+              <a:rPr lang="en-ZA" dirty="0">
+                <a:latin typeface="AdvOT7d6df7ab.I"/>
+              </a:rPr>
+              <a:t>Imputation</a:t>
+            </a:r>
+            <a:endParaRPr lang="en-ZA" dirty="0"/>
+          </a:p>
+        </p:txBody>
+      </p:sp>
+      <p:sp>
+        <p:nvSpPr>
+          <p:cNvPr id="35" name="TextBox 34">
+            <a:extLst>
+              <a:ext uri="{FF2B5EF4-FFF2-40B4-BE49-F238E27FC236}">
+                <a16:creationId xmlns:a16="http://schemas.microsoft.com/office/drawing/2014/main" id="{E99438E9-3911-E39F-99FD-DA5E70F098D8}"/>
+              </a:ext>
+            </a:extLst>
+          </p:cNvPr>
+          <p:cNvSpPr txBox="1"/>
+          <p:nvPr/>
+        </p:nvSpPr>
+        <p:spPr>
+          <a:xfrm>
+            <a:off x="12432397" y="9071859"/>
+            <a:ext cx="2382982" cy="369332"/>
+          </a:xfrm>
+          <a:prstGeom prst="rect">
+            <a:avLst/>
+          </a:prstGeom>
+          <a:noFill/>
+          <a:ln>
+            <a:solidFill>
+              <a:schemeClr val="accent1"/>
+            </a:solidFill>
+          </a:ln>
+        </p:spPr>
+        <p:txBody>
+          <a:bodyPr wrap="square" rtlCol="0">
+            <a:spAutoFit/>
+          </a:bodyPr>
+          <a:lstStyle/>
+          <a:p>
+            <a:r>
+              <a:rPr lang="en-ZA" dirty="0">
+                <a:latin typeface="AdvOT7d6df7ab.I"/>
+              </a:rPr>
+              <a:t>Feature deletion</a:t>
+            </a:r>
+            <a:endParaRPr lang="en-ZA" dirty="0"/>
+          </a:p>
+        </p:txBody>
+      </p:sp>
+      <p:sp>
+        <p:nvSpPr>
+          <p:cNvPr id="36" name="TextBox 35">
+            <a:extLst>
+              <a:ext uri="{FF2B5EF4-FFF2-40B4-BE49-F238E27FC236}">
+                <a16:creationId xmlns:a16="http://schemas.microsoft.com/office/drawing/2014/main" id="{B99ECE9B-7967-E74B-1199-34CEB5A0D541}"/>
+              </a:ext>
+            </a:extLst>
+          </p:cNvPr>
+          <p:cNvSpPr txBox="1"/>
+          <p:nvPr/>
+        </p:nvSpPr>
+        <p:spPr>
+          <a:xfrm>
+            <a:off x="15617681" y="7779993"/>
+            <a:ext cx="2382982" cy="369332"/>
+          </a:xfrm>
+          <a:prstGeom prst="rect">
+            <a:avLst/>
+          </a:prstGeom>
+          <a:noFill/>
+          <a:ln>
+            <a:solidFill>
+              <a:schemeClr val="accent1"/>
+            </a:solidFill>
+          </a:ln>
+        </p:spPr>
+        <p:txBody>
+          <a:bodyPr wrap="square" rtlCol="0">
+            <a:spAutoFit/>
+          </a:bodyPr>
+          <a:lstStyle/>
+          <a:p>
+            <a:r>
+              <a:rPr lang="en-ZA" dirty="0">
+                <a:latin typeface="AdvOT7d6df7ab.I"/>
+              </a:rPr>
+              <a:t>Range of numeric data</a:t>
+            </a:r>
+            <a:endParaRPr lang="en-ZA" dirty="0"/>
+          </a:p>
+        </p:txBody>
+      </p:sp>
+      <p:sp>
+        <p:nvSpPr>
+          <p:cNvPr id="37" name="TextBox 36">
+            <a:extLst>
+              <a:ext uri="{FF2B5EF4-FFF2-40B4-BE49-F238E27FC236}">
+                <a16:creationId xmlns:a16="http://schemas.microsoft.com/office/drawing/2014/main" id="{AB749D5B-952B-E24A-A353-D4EEA9A14DEE}"/>
+              </a:ext>
+            </a:extLst>
+          </p:cNvPr>
+          <p:cNvSpPr txBox="1"/>
+          <p:nvPr/>
+        </p:nvSpPr>
+        <p:spPr>
+          <a:xfrm>
+            <a:off x="18063515" y="8662752"/>
+            <a:ext cx="1998265" cy="369332"/>
+          </a:xfrm>
+          <a:prstGeom prst="rect">
+            <a:avLst/>
+          </a:prstGeom>
+          <a:noFill/>
+          <a:ln>
+            <a:solidFill>
+              <a:schemeClr val="accent1"/>
+            </a:solidFill>
+          </a:ln>
+        </p:spPr>
+        <p:txBody>
+          <a:bodyPr wrap="square" rtlCol="0">
+            <a:spAutoFit/>
+          </a:bodyPr>
+          <a:lstStyle/>
+          <a:p>
+            <a:r>
+              <a:rPr lang="en-ZA" dirty="0">
+                <a:latin typeface="AdvOT7d6df7ab.I"/>
+              </a:rPr>
+              <a:t>Data in same range</a:t>
+            </a:r>
+            <a:endParaRPr lang="en-ZA" dirty="0"/>
+          </a:p>
+        </p:txBody>
+      </p:sp>
+      <p:sp>
+        <p:nvSpPr>
+          <p:cNvPr id="38" name="TextBox 37">
+            <a:extLst>
+              <a:ext uri="{FF2B5EF4-FFF2-40B4-BE49-F238E27FC236}">
+                <a16:creationId xmlns:a16="http://schemas.microsoft.com/office/drawing/2014/main" id="{220F5B35-9468-AA31-C9BB-FC70D937B34B}"/>
+              </a:ext>
+            </a:extLst>
+          </p:cNvPr>
+          <p:cNvSpPr txBox="1"/>
+          <p:nvPr/>
+        </p:nvSpPr>
+        <p:spPr>
+          <a:xfrm>
+            <a:off x="17975713" y="7014508"/>
+            <a:ext cx="3206999" cy="369332"/>
+          </a:xfrm>
+          <a:prstGeom prst="rect">
+            <a:avLst/>
+          </a:prstGeom>
+          <a:noFill/>
+          <a:ln>
+            <a:solidFill>
+              <a:schemeClr val="accent1"/>
+            </a:solidFill>
+          </a:ln>
+        </p:spPr>
+        <p:txBody>
+          <a:bodyPr wrap="square" rtlCol="0">
+            <a:spAutoFit/>
+          </a:bodyPr>
+          <a:lstStyle/>
+          <a:p>
+            <a:r>
+              <a:rPr lang="en-ZA" dirty="0"/>
+              <a:t>Skew/Large difference in range</a:t>
+            </a:r>
+          </a:p>
+        </p:txBody>
+      </p:sp>
+      <p:sp>
+        <p:nvSpPr>
+          <p:cNvPr id="39" name="TextBox 38">
+            <a:extLst>
+              <a:ext uri="{FF2B5EF4-FFF2-40B4-BE49-F238E27FC236}">
+                <a16:creationId xmlns:a16="http://schemas.microsoft.com/office/drawing/2014/main" id="{058C97BD-3D85-449D-477E-17BE5281DE33}"/>
+              </a:ext>
+            </a:extLst>
+          </p:cNvPr>
+          <p:cNvSpPr txBox="1"/>
+          <p:nvPr/>
+        </p:nvSpPr>
+        <p:spPr>
+          <a:xfrm>
+            <a:off x="22035464" y="6929664"/>
+            <a:ext cx="845801" cy="369332"/>
+          </a:xfrm>
+          <a:prstGeom prst="rect">
+            <a:avLst/>
+          </a:prstGeom>
+          <a:noFill/>
+          <a:ln>
+            <a:solidFill>
+              <a:schemeClr val="accent1"/>
+            </a:solidFill>
+          </a:ln>
+        </p:spPr>
+        <p:txBody>
+          <a:bodyPr wrap="square" rtlCol="0">
+            <a:spAutoFit/>
+          </a:bodyPr>
+          <a:lstStyle/>
+          <a:p>
+            <a:r>
+              <a:rPr lang="en-ZA" dirty="0" err="1">
+                <a:latin typeface="AdvOT7d6df7ab.I"/>
+              </a:rPr>
+              <a:t>kNN</a:t>
+            </a:r>
+            <a:endParaRPr lang="en-ZA" dirty="0"/>
+          </a:p>
+        </p:txBody>
+      </p:sp>
+      <p:sp>
+        <p:nvSpPr>
+          <p:cNvPr id="40" name="TextBox 39">
+            <a:extLst>
+              <a:ext uri="{FF2B5EF4-FFF2-40B4-BE49-F238E27FC236}">
+                <a16:creationId xmlns:a16="http://schemas.microsoft.com/office/drawing/2014/main" id="{0A2B2165-2F05-CA01-8D91-E2B9405BE9A7}"/>
+              </a:ext>
+            </a:extLst>
+          </p:cNvPr>
+          <p:cNvSpPr txBox="1"/>
+          <p:nvPr/>
+        </p:nvSpPr>
+        <p:spPr>
+          <a:xfrm>
+            <a:off x="22090704" y="8293420"/>
+            <a:ext cx="790561" cy="369332"/>
+          </a:xfrm>
+          <a:prstGeom prst="rect">
+            <a:avLst/>
+          </a:prstGeom>
+          <a:noFill/>
+          <a:ln>
+            <a:solidFill>
+              <a:schemeClr val="accent1"/>
+            </a:solidFill>
+          </a:ln>
+        </p:spPr>
+        <p:txBody>
+          <a:bodyPr wrap="square" rtlCol="0">
+            <a:spAutoFit/>
+          </a:bodyPr>
+          <a:lstStyle/>
+          <a:p>
+            <a:r>
+              <a:rPr lang="en-ZA" dirty="0">
+                <a:latin typeface="AdvOT7d6df7ab.I"/>
+              </a:rPr>
+              <a:t>Mean</a:t>
+            </a:r>
+            <a:endParaRPr lang="en-ZA" dirty="0"/>
+          </a:p>
+        </p:txBody>
+      </p:sp>
+    </p:spTree>
+    <p:extLst>
+      <p:ext uri="{BB962C8B-B14F-4D97-AF65-F5344CB8AC3E}">
+        <p14:creationId xmlns:p14="http://schemas.microsoft.com/office/powerpoint/2010/main" val="2233649911"/>
       </p:ext>
     </p:extLst>
   </p:cSld>

</xml_diff>